<commit_message>
class03: add a remark about FS UUIDs and VM clones.
</commit_message>
<xml_diff>
--- a/talks/src/class03.pptx
+++ b/talks/src/class03.pptx
@@ -5,7 +5,7 @@
     <p:sldMasterId id="2147483648" r:id="rId1"/>
   </p:sldMasterIdLst>
   <p:notesMasterIdLst>
-    <p:notesMasterId r:id="rId47"/>
+    <p:notesMasterId r:id="rId48"/>
   </p:notesMasterIdLst>
   <p:sldIdLst>
     <p:sldId id="280" r:id="rId2"/>
@@ -45,14 +45,15 @@
     <p:sldId id="347" r:id="rId36"/>
     <p:sldId id="348" r:id="rId37"/>
     <p:sldId id="300" r:id="rId38"/>
-    <p:sldId id="319" r:id="rId39"/>
-    <p:sldId id="318" r:id="rId40"/>
-    <p:sldId id="306" r:id="rId41"/>
-    <p:sldId id="307" r:id="rId42"/>
-    <p:sldId id="305" r:id="rId43"/>
-    <p:sldId id="309" r:id="rId44"/>
-    <p:sldId id="310" r:id="rId45"/>
-    <p:sldId id="349" r:id="rId46"/>
+    <p:sldId id="350" r:id="rId39"/>
+    <p:sldId id="319" r:id="rId40"/>
+    <p:sldId id="318" r:id="rId41"/>
+    <p:sldId id="306" r:id="rId42"/>
+    <p:sldId id="307" r:id="rId43"/>
+    <p:sldId id="305" r:id="rId44"/>
+    <p:sldId id="309" r:id="rId45"/>
+    <p:sldId id="310" r:id="rId46"/>
+    <p:sldId id="349" r:id="rId47"/>
   </p:sldIdLst>
   <p:sldSz cx="12192000" cy="6858000"/>
   <p:notesSz cx="6858000" cy="9144000"/>
@@ -241,7 +242,7 @@
           <a:p>
             <a:fld id="{F378FDCC-6E3B-8447-A84A-C1F15F2E44EA}" type="datetimeFigureOut">
               <a:rPr lang="ru-RU" smtClean="0"/>
-              <a:t>03.10.2022</a:t>
+              <a:t>09.10.2023</a:t>
             </a:fld>
             <a:endParaRPr lang="ru-RU"/>
           </a:p>
@@ -3891,7 +3892,7 @@
     </p:spTree>
     <p:extLst>
       <p:ext uri="{BB962C8B-B14F-4D97-AF65-F5344CB8AC3E}">
-        <p14:creationId xmlns:p14="http://schemas.microsoft.com/office/powerpoint/2010/main" val="40119278"/>
+        <p14:creationId xmlns:p14="http://schemas.microsoft.com/office/powerpoint/2010/main" val="3154457145"/>
       </p:ext>
     </p:extLst>
   </p:cSld>
@@ -3997,7 +3998,7 @@
     </p:spTree>
     <p:extLst>
       <p:ext uri="{BB962C8B-B14F-4D97-AF65-F5344CB8AC3E}">
-        <p14:creationId xmlns:p14="http://schemas.microsoft.com/office/powerpoint/2010/main" val="395412968"/>
+        <p14:creationId xmlns:p14="http://schemas.microsoft.com/office/powerpoint/2010/main" val="40119278"/>
       </p:ext>
     </p:extLst>
   </p:cSld>
@@ -4209,7 +4210,7 @@
     </p:spTree>
     <p:extLst>
       <p:ext uri="{BB962C8B-B14F-4D97-AF65-F5344CB8AC3E}">
-        <p14:creationId xmlns:p14="http://schemas.microsoft.com/office/powerpoint/2010/main" val="2592214898"/>
+        <p14:creationId xmlns:p14="http://schemas.microsoft.com/office/powerpoint/2010/main" val="395412968"/>
       </p:ext>
     </p:extLst>
   </p:cSld>
@@ -4315,7 +4316,7 @@
     </p:spTree>
     <p:extLst>
       <p:ext uri="{BB962C8B-B14F-4D97-AF65-F5344CB8AC3E}">
-        <p14:creationId xmlns:p14="http://schemas.microsoft.com/office/powerpoint/2010/main" val="139822215"/>
+        <p14:creationId xmlns:p14="http://schemas.microsoft.com/office/powerpoint/2010/main" val="2592214898"/>
       </p:ext>
     </p:extLst>
   </p:cSld>
@@ -4421,7 +4422,7 @@
     </p:spTree>
     <p:extLst>
       <p:ext uri="{BB962C8B-B14F-4D97-AF65-F5344CB8AC3E}">
-        <p14:creationId xmlns:p14="http://schemas.microsoft.com/office/powerpoint/2010/main" val="2714254550"/>
+        <p14:creationId xmlns:p14="http://schemas.microsoft.com/office/powerpoint/2010/main" val="139822215"/>
       </p:ext>
     </p:extLst>
   </p:cSld>
@@ -4527,7 +4528,7 @@
     </p:spTree>
     <p:extLst>
       <p:ext uri="{BB962C8B-B14F-4D97-AF65-F5344CB8AC3E}">
-        <p14:creationId xmlns:p14="http://schemas.microsoft.com/office/powerpoint/2010/main" val="3895778451"/>
+        <p14:creationId xmlns:p14="http://schemas.microsoft.com/office/powerpoint/2010/main" val="2714254550"/>
       </p:ext>
     </p:extLst>
   </p:cSld>
@@ -4633,7 +4634,7 @@
     </p:spTree>
     <p:extLst>
       <p:ext uri="{BB962C8B-B14F-4D97-AF65-F5344CB8AC3E}">
-        <p14:creationId xmlns:p14="http://schemas.microsoft.com/office/powerpoint/2010/main" val="1863544739"/>
+        <p14:creationId xmlns:p14="http://schemas.microsoft.com/office/powerpoint/2010/main" val="3895778451"/>
       </p:ext>
     </p:extLst>
   </p:cSld>
@@ -4709,6 +4710,112 @@
             <a:fld id="{7F33120B-582B-4354-977D-A474A534F6B9}" type="slidenum">
               <a:rPr lang="ru-RU" smtClean="0"/>
               <a:t>45</a:t>
+            </a:fld>
+            <a:endParaRPr lang="ru-RU"/>
+          </a:p>
+        </p:txBody>
+      </p:sp>
+      <p:sp>
+        <p:nvSpPr>
+          <p:cNvPr id="5" name="Header Placeholder 4"/>
+          <p:cNvSpPr>
+            <a:spLocks noGrp="1"/>
+          </p:cNvSpPr>
+          <p:nvPr>
+            <p:ph type="hdr" sz="quarter" idx="11"/>
+          </p:nvPr>
+        </p:nvSpPr>
+        <p:spPr/>
+        <p:txBody>
+          <a:bodyPr/>
+          <a:lstStyle/>
+          <a:p>
+            <a:r>
+              <a:rPr lang="ru-RU"/>
+              <a:t>Основы построения файловых систем</a:t>
+            </a:r>
+          </a:p>
+        </p:txBody>
+      </p:sp>
+    </p:spTree>
+    <p:extLst>
+      <p:ext uri="{BB962C8B-B14F-4D97-AF65-F5344CB8AC3E}">
+        <p14:creationId xmlns:p14="http://schemas.microsoft.com/office/powerpoint/2010/main" val="1863544739"/>
+      </p:ext>
+    </p:extLst>
+  </p:cSld>
+  <p:clrMapOvr>
+    <a:masterClrMapping/>
+  </p:clrMapOvr>
+</p:notes>
+</file>
+
+<file path=ppt/notesSlides/notesSlide46.xml><?xml version="1.0" encoding="utf-8"?>
+<p:notes xmlns:a="http://schemas.openxmlformats.org/drawingml/2006/main" xmlns:r="http://schemas.openxmlformats.org/officeDocument/2006/relationships" xmlns:p="http://schemas.openxmlformats.org/presentationml/2006/main">
+  <p:cSld>
+    <p:spTree>
+      <p:nvGrpSpPr>
+        <p:cNvPr id="1" name=""/>
+        <p:cNvGrpSpPr/>
+        <p:nvPr/>
+      </p:nvGrpSpPr>
+      <p:grpSpPr>
+        <a:xfrm>
+          <a:off x="0" y="0"/>
+          <a:ext cx="0" cy="0"/>
+          <a:chOff x="0" y="0"/>
+          <a:chExt cx="0" cy="0"/>
+        </a:xfrm>
+      </p:grpSpPr>
+      <p:sp>
+        <p:nvSpPr>
+          <p:cNvPr id="2" name="Slide Image Placeholder 1"/>
+          <p:cNvSpPr>
+            <a:spLocks noGrp="1" noRot="1" noChangeAspect="1"/>
+          </p:cNvSpPr>
+          <p:nvPr>
+            <p:ph type="sldImg"/>
+          </p:nvPr>
+        </p:nvSpPr>
+        <p:spPr/>
+      </p:sp>
+      <p:sp>
+        <p:nvSpPr>
+          <p:cNvPr id="3" name="Notes Placeholder 2"/>
+          <p:cNvSpPr>
+            <a:spLocks noGrp="1"/>
+          </p:cNvSpPr>
+          <p:nvPr>
+            <p:ph type="body" idx="1"/>
+          </p:nvPr>
+        </p:nvSpPr>
+        <p:spPr/>
+        <p:txBody>
+          <a:bodyPr/>
+          <a:lstStyle/>
+          <a:p>
+            <a:endParaRPr lang="ru-RU"/>
+          </a:p>
+        </p:txBody>
+      </p:sp>
+      <p:sp>
+        <p:nvSpPr>
+          <p:cNvPr id="4" name="Slide Number Placeholder 3"/>
+          <p:cNvSpPr>
+            <a:spLocks noGrp="1"/>
+          </p:cNvSpPr>
+          <p:nvPr>
+            <p:ph type="sldNum" sz="quarter" idx="10"/>
+          </p:nvPr>
+        </p:nvSpPr>
+        <p:spPr/>
+        <p:txBody>
+          <a:bodyPr/>
+          <a:lstStyle/>
+          <a:p>
+            <a:fld id="{7F33120B-582B-4354-977D-A474A534F6B9}" type="slidenum">
+              <a:rPr lang="ru-RU" smtClean="0"/>
+              <a:t>46</a:t>
             </a:fld>
             <a:endParaRPr lang="ru-RU"/>
           </a:p>
@@ -5428,7 +5535,7 @@
           <a:p>
             <a:fld id="{4427D850-C269-5040-9E1D-5D50C477E825}" type="datetimeFigureOut">
               <a:rPr lang="ru-RU" smtClean="0"/>
-              <a:t>03.10.2022</a:t>
+              <a:t>09.10.2023</a:t>
             </a:fld>
             <a:endParaRPr lang="ru-RU"/>
           </a:p>
@@ -5628,7 +5735,7 @@
           <a:p>
             <a:fld id="{4427D850-C269-5040-9E1D-5D50C477E825}" type="datetimeFigureOut">
               <a:rPr lang="ru-RU" smtClean="0"/>
-              <a:t>03.10.2022</a:t>
+              <a:t>09.10.2023</a:t>
             </a:fld>
             <a:endParaRPr lang="ru-RU"/>
           </a:p>
@@ -5838,7 +5945,7 @@
           <a:p>
             <a:fld id="{4427D850-C269-5040-9E1D-5D50C477E825}" type="datetimeFigureOut">
               <a:rPr lang="ru-RU" smtClean="0"/>
-              <a:t>03.10.2022</a:t>
+              <a:t>09.10.2023</a:t>
             </a:fld>
             <a:endParaRPr lang="ru-RU"/>
           </a:p>
@@ -6038,7 +6145,7 @@
           <a:p>
             <a:fld id="{4427D850-C269-5040-9E1D-5D50C477E825}" type="datetimeFigureOut">
               <a:rPr lang="ru-RU" smtClean="0"/>
-              <a:t>03.10.2022</a:t>
+              <a:t>09.10.2023</a:t>
             </a:fld>
             <a:endParaRPr lang="ru-RU"/>
           </a:p>
@@ -6314,7 +6421,7 @@
           <a:p>
             <a:fld id="{4427D850-C269-5040-9E1D-5D50C477E825}" type="datetimeFigureOut">
               <a:rPr lang="ru-RU" smtClean="0"/>
-              <a:t>03.10.2022</a:t>
+              <a:t>09.10.2023</a:t>
             </a:fld>
             <a:endParaRPr lang="ru-RU"/>
           </a:p>
@@ -6582,7 +6689,7 @@
           <a:p>
             <a:fld id="{4427D850-C269-5040-9E1D-5D50C477E825}" type="datetimeFigureOut">
               <a:rPr lang="ru-RU" smtClean="0"/>
-              <a:t>03.10.2022</a:t>
+              <a:t>09.10.2023</a:t>
             </a:fld>
             <a:endParaRPr lang="ru-RU"/>
           </a:p>
@@ -6997,7 +7104,7 @@
           <a:p>
             <a:fld id="{4427D850-C269-5040-9E1D-5D50C477E825}" type="datetimeFigureOut">
               <a:rPr lang="ru-RU" smtClean="0"/>
-              <a:t>03.10.2022</a:t>
+              <a:t>09.10.2023</a:t>
             </a:fld>
             <a:endParaRPr lang="ru-RU"/>
           </a:p>
@@ -7139,7 +7246,7 @@
           <a:p>
             <a:fld id="{4427D850-C269-5040-9E1D-5D50C477E825}" type="datetimeFigureOut">
               <a:rPr lang="ru-RU" smtClean="0"/>
-              <a:t>03.10.2022</a:t>
+              <a:t>09.10.2023</a:t>
             </a:fld>
             <a:endParaRPr lang="ru-RU"/>
           </a:p>
@@ -7252,7 +7359,7 @@
           <a:p>
             <a:fld id="{4427D850-C269-5040-9E1D-5D50C477E825}" type="datetimeFigureOut">
               <a:rPr lang="ru-RU" smtClean="0"/>
-              <a:t>03.10.2022</a:t>
+              <a:t>09.10.2023</a:t>
             </a:fld>
             <a:endParaRPr lang="ru-RU"/>
           </a:p>
@@ -7565,7 +7672,7 @@
           <a:p>
             <a:fld id="{4427D850-C269-5040-9E1D-5D50C477E825}" type="datetimeFigureOut">
               <a:rPr lang="ru-RU" smtClean="0"/>
-              <a:t>03.10.2022</a:t>
+              <a:t>09.10.2023</a:t>
             </a:fld>
             <a:endParaRPr lang="ru-RU"/>
           </a:p>
@@ -7854,7 +7961,7 @@
           <a:p>
             <a:fld id="{4427D850-C269-5040-9E1D-5D50C477E825}" type="datetimeFigureOut">
               <a:rPr lang="ru-RU" smtClean="0"/>
-              <a:t>03.10.2022</a:t>
+              <a:t>09.10.2023</a:t>
             </a:fld>
             <a:endParaRPr lang="ru-RU"/>
           </a:p>
@@ -8097,7 +8204,7 @@
           <a:p>
             <a:fld id="{4427D850-C269-5040-9E1D-5D50C477E825}" type="datetimeFigureOut">
               <a:rPr lang="ru-RU" smtClean="0"/>
-              <a:t>03.10.2022</a:t>
+              <a:t>09.10.2023</a:t>
             </a:fld>
             <a:endParaRPr lang="ru-RU"/>
           </a:p>
@@ -36817,7 +36924,7 @@
 </file>
 
 <file path=ppt/slides/slide37.xml><?xml version="1.0" encoding="utf-8"?>
-<p:sld xmlns:a="http://schemas.openxmlformats.org/drawingml/2006/main" xmlns:r="http://schemas.openxmlformats.org/officeDocument/2006/relationships" xmlns:p="http://schemas.openxmlformats.org/presentationml/2006/main">
+<p:sld xmlns:a="http://schemas.openxmlformats.org/drawingml/2006/main" xmlns:r="http://schemas.openxmlformats.org/officeDocument/2006/relationships" xmlns:p="http://schemas.openxmlformats.org/presentationml/2006/main" show="0">
   <p:cSld>
     <p:spTree>
       <p:nvGrpSpPr>
@@ -37091,6 +37198,54 @@
           </a:graphicData>
         </a:graphic>
       </p:graphicFrame>
+      <p:sp>
+        <p:nvSpPr>
+          <p:cNvPr id="3" name="TextBox 2">
+            <a:extLst>
+              <a:ext uri="{FF2B5EF4-FFF2-40B4-BE49-F238E27FC236}">
+                <a16:creationId xmlns:a16="http://schemas.microsoft.com/office/drawing/2014/main" id="{13A20552-66DA-C6E4-2D82-F386531916E9}"/>
+              </a:ext>
+            </a:extLst>
+          </p:cNvPr>
+          <p:cNvSpPr txBox="1"/>
+          <p:nvPr/>
+        </p:nvSpPr>
+        <p:spPr>
+          <a:xfrm>
+            <a:off x="1391478" y="2683565"/>
+            <a:ext cx="7772400" cy="923330"/>
+          </a:xfrm>
+          <a:prstGeom prst="rect">
+            <a:avLst/>
+          </a:prstGeom>
+          <a:noFill/>
+        </p:spPr>
+        <p:txBody>
+          <a:bodyPr wrap="square" rtlCol="0">
+            <a:spAutoFit/>
+          </a:bodyPr>
+          <a:lstStyle/>
+          <a:p>
+            <a:r>
+              <a:rPr lang="en-GB" dirty="0">
+                <a:hlinkClick r:id="rId3"/>
+              </a:rPr>
+              <a:t>https://lwn.net/Articles/923969/</a:t>
+            </a:r>
+            <a:endParaRPr lang="en-GB" dirty="0"/>
+          </a:p>
+          <a:p>
+            <a:endParaRPr lang="en-GB" dirty="0"/>
+          </a:p>
+          <a:p>
+            <a:r>
+              <a:rPr lang="en-GB" dirty="0"/>
+              <a:t>Discuss: fs UUIDs and VM clones</a:t>
+            </a:r>
+            <a:endParaRPr lang="en-CY" dirty="0"/>
+          </a:p>
+        </p:txBody>
+      </p:sp>
     </p:spTree>
     <p:extLst>
       <p:ext uri="{BB962C8B-B14F-4D97-AF65-F5344CB8AC3E}">
@@ -37183,13 +37338,7 @@
           <p:cNvGraphicFramePr>
             <a:graphicFrameLocks noGrp="1"/>
           </p:cNvGraphicFramePr>
-          <p:nvPr>
-            <p:extLst>
-              <p:ext uri="{D42A27DB-BD31-4B8C-83A1-F6EECF244321}">
-                <p14:modId xmlns:p14="http://schemas.microsoft.com/office/powerpoint/2010/main" val="878078681"/>
-              </p:ext>
-            </p:extLst>
-          </p:nvPr>
+          <p:nvPr/>
         </p:nvGraphicFramePr>
         <p:xfrm>
           <a:off x="0" y="6532604"/>
@@ -37237,17 +37386,11 @@
           <p:cNvGraphicFramePr>
             <a:graphicFrameLocks noGrp="1"/>
           </p:cNvGraphicFramePr>
-          <p:nvPr>
-            <p:extLst>
-              <p:ext uri="{D42A27DB-BD31-4B8C-83A1-F6EECF244321}">
-                <p14:modId xmlns:p14="http://schemas.microsoft.com/office/powerpoint/2010/main" val="842249320"/>
-              </p:ext>
-            </p:extLst>
-          </p:nvPr>
+          <p:nvPr/>
         </p:nvGraphicFramePr>
         <p:xfrm>
           <a:off x="0" y="365762"/>
-          <a:ext cx="12192000" cy="3383280"/>
+          <a:ext cx="12192000" cy="1920240"/>
         </p:xfrm>
         <a:graphic>
           <a:graphicData uri="http://schemas.openxmlformats.org/drawingml/2006/table">
@@ -37381,58 +37524,6 @@
                   </a:ext>
                 </a:extLst>
               </a:tr>
-              <a:tr h="0">
-                <a:tc>
-                  <a:txBody>
-                    <a:bodyPr/>
-                    <a:lstStyle/>
-                    <a:p>
-                      <a:endParaRPr lang="en-US" dirty="0"/>
-                    </a:p>
-                    <a:p>
-                      <a:r>
-                        <a:rPr lang="en-US" dirty="0" err="1"/>
-                        <a:t>Compat</a:t>
-                      </a:r>
-                      <a:r>
-                        <a:rPr lang="en-US" dirty="0"/>
-                        <a:t>-discard features</a:t>
-                      </a:r>
-                      <a:r>
-                        <a:rPr lang="en-US" baseline="0" dirty="0"/>
-                        <a:t> (QCOW2): </a:t>
-                      </a:r>
-                      <a:r>
-                        <a:rPr lang="ru-RU" baseline="0" dirty="0"/>
-                        <a:t>старые реализации могут и читать, и писать, но должны обнулить указатели на структуры, которые они не поддерживают.</a:t>
-                      </a:r>
-                    </a:p>
-                    <a:p>
-                      <a:endParaRPr lang="ru-RU" baseline="0" dirty="0"/>
-                    </a:p>
-                    <a:p>
-                      <a:r>
-                        <a:rPr lang="ru-RU" b="1" baseline="0" dirty="0"/>
-                        <a:t>Пример:</a:t>
-                      </a:r>
-                      <a:r>
-                        <a:rPr lang="ru-RU" baseline="0" dirty="0"/>
-                        <a:t> </a:t>
-                      </a:r>
-                      <a:r>
-                        <a:rPr lang="en-US" baseline="0" dirty="0"/>
-                        <a:t>CBT map (Changed Block Tracking map).</a:t>
-                      </a:r>
-                    </a:p>
-                  </a:txBody>
-                  <a:tcPr/>
-                </a:tc>
-                <a:extLst>
-                  <a:ext uri="{0D108BD9-81ED-4DB2-BD59-A6C34878D82A}">
-                    <a16:rowId xmlns:a16="http://schemas.microsoft.com/office/drawing/2014/main" val="10002"/>
-                  </a:ext>
-                </a:extLst>
-              </a:tr>
             </a:tbl>
           </a:graphicData>
         </a:graphic>
@@ -37440,7 +37531,7 @@
     </p:spTree>
     <p:extLst>
       <p:ext uri="{BB962C8B-B14F-4D97-AF65-F5344CB8AC3E}">
-        <p14:creationId xmlns:p14="http://schemas.microsoft.com/office/powerpoint/2010/main" val="4252637324"/>
+        <p14:creationId xmlns:p14="http://schemas.microsoft.com/office/powerpoint/2010/main" val="456649344"/>
       </p:ext>
     </p:extLst>
   </p:cSld>
@@ -37532,7 +37623,7 @@
           <p:nvPr>
             <p:extLst>
               <p:ext uri="{D42A27DB-BD31-4B8C-83A1-F6EECF244321}">
-                <p14:modId xmlns:p14="http://schemas.microsoft.com/office/powerpoint/2010/main" val="2009648513"/>
+                <p14:modId xmlns:p14="http://schemas.microsoft.com/office/powerpoint/2010/main" val="878078681"/>
               </p:ext>
             </p:extLst>
           </p:nvPr>
@@ -37586,14 +37677,14 @@
           <p:nvPr>
             <p:extLst>
               <p:ext uri="{D42A27DB-BD31-4B8C-83A1-F6EECF244321}">
-                <p14:modId xmlns:p14="http://schemas.microsoft.com/office/powerpoint/2010/main" val="63366330"/>
+                <p14:modId xmlns:p14="http://schemas.microsoft.com/office/powerpoint/2010/main" val="842249320"/>
               </p:ext>
             </p:extLst>
           </p:nvPr>
         </p:nvGraphicFramePr>
         <p:xfrm>
           <a:off x="0" y="365762"/>
-          <a:ext cx="12192000" cy="1920240"/>
+          <a:ext cx="12192000" cy="3383280"/>
         </p:xfrm>
         <a:graphic>
           <a:graphicData uri="http://schemas.openxmlformats.org/drawingml/2006/table">
@@ -37658,12 +37749,12 @@
                     <a:lstStyle/>
                     <a:p>
                       <a:r>
-                        <a:rPr lang="en-US" dirty="0"/>
-                        <a:t>Compat features:</a:t>
-                      </a:r>
-                      <a:r>
-                        <a:rPr lang="ru-RU" dirty="0"/>
-                        <a:t> </a:t>
+                        <a:rPr lang="en-US" dirty="0" err="1"/>
+                        <a:t>Compat</a:t>
+                      </a:r>
+                      <a:r>
+                        <a:rPr lang="en-US" baseline="0" dirty="0"/>
+                        <a:t> features: </a:t>
                       </a:r>
                       <a:r>
                         <a:rPr lang="ru-RU" baseline="0" dirty="0"/>
@@ -37677,47 +37768,46 @@
                         <a:rPr lang="ru-RU" baseline="0" dirty="0"/>
                         <a:t>могут и читать, и писать на такую файловую систему.</a:t>
                       </a:r>
+                      <a:endParaRPr lang="en-US" baseline="0" dirty="0"/>
+                    </a:p>
+                    <a:p>
+                      <a:endParaRPr lang="en-US" baseline="0" dirty="0"/>
+                    </a:p>
+                    <a:p>
+                      <a:r>
+                        <a:rPr lang="en-US" baseline="0" dirty="0"/>
+                        <a:t>RO-</a:t>
+                      </a:r>
+                      <a:r>
+                        <a:rPr lang="en-US" baseline="0" dirty="0" err="1"/>
+                        <a:t>compat</a:t>
+                      </a:r>
+                      <a:r>
+                        <a:rPr lang="en-US" baseline="0" dirty="0"/>
+                        <a:t> features: </a:t>
+                      </a:r>
+                      <a:r>
+                        <a:rPr lang="ru-RU" baseline="0" dirty="0"/>
+                        <a:t>старые реализации могут корректно читать такую ФС, но писать в неё уже нет.</a:t>
+                      </a:r>
+                    </a:p>
+                    <a:p>
+                      <a:endParaRPr lang="ru-RU" baseline="0" dirty="0"/>
+                    </a:p>
+                    <a:p>
+                      <a:r>
+                        <a:rPr lang="en-US" baseline="0" dirty="0" err="1"/>
+                        <a:t>Incompat</a:t>
+                      </a:r>
+                      <a:r>
+                        <a:rPr lang="en-US" baseline="0" dirty="0"/>
+                        <a:t> features: </a:t>
+                      </a:r>
+                      <a:r>
+                        <a:rPr lang="ru-RU" baseline="0" dirty="0"/>
+                        <a:t>старые реализации не могут смонтировать такую ФС.</a:t>
+                      </a:r>
                       <a:endParaRPr lang="en-US" dirty="0"/>
-                    </a:p>
-                    <a:p>
-                      <a:pPr marL="285750" indent="-285750">
-                        <a:buFont typeface="Arial" panose="020B0604020202020204" pitchFamily="34" charset="0"/>
-                        <a:buChar char="•"/>
-                      </a:pPr>
-                      <a:r>
-                        <a:rPr lang="en-US" dirty="0"/>
-                        <a:t>EXT4_FEATURE_COMPAT_DIR_PREALLOC</a:t>
-                      </a:r>
-                    </a:p>
-                    <a:p>
-                      <a:pPr marL="285750" indent="-285750">
-                        <a:buFont typeface="Arial" panose="020B0604020202020204" pitchFamily="34" charset="0"/>
-                        <a:buChar char="•"/>
-                      </a:pPr>
-                      <a:r>
-                        <a:rPr lang="en-US" dirty="0"/>
-                        <a:t>EXT4_FEATURE_COMPAT_HAS_JOURNAL</a:t>
-                      </a:r>
-                    </a:p>
-                    <a:p>
-                      <a:pPr marL="285750" indent="-285750">
-                        <a:buFont typeface="Arial" panose="020B0604020202020204" pitchFamily="34" charset="0"/>
-                        <a:buChar char="•"/>
-                      </a:pPr>
-                      <a:r>
-                        <a:rPr lang="en-US" dirty="0"/>
-                        <a:t>EXT4_FEATURE_COMPAT_EXT_ATTR</a:t>
-                      </a:r>
-                    </a:p>
-                    <a:p>
-                      <a:pPr marL="285750" indent="-285750">
-                        <a:buFont typeface="Arial" panose="020B0604020202020204" pitchFamily="34" charset="0"/>
-                        <a:buChar char="•"/>
-                      </a:pPr>
-                      <a:r>
-                        <a:rPr lang="en-US" dirty="0"/>
-                        <a:t>EXT4_FEATURE_COMPAT_DIR_INDEX (hash directories)</a:t>
-                      </a:r>
                     </a:p>
                   </a:txBody>
                   <a:tcPr/>
@@ -37725,6 +37815,58 @@
                 <a:extLst>
                   <a:ext uri="{0D108BD9-81ED-4DB2-BD59-A6C34878D82A}">
                     <a16:rowId xmlns:a16="http://schemas.microsoft.com/office/drawing/2014/main" val="10001"/>
+                  </a:ext>
+                </a:extLst>
+              </a:tr>
+              <a:tr h="0">
+                <a:tc>
+                  <a:txBody>
+                    <a:bodyPr/>
+                    <a:lstStyle/>
+                    <a:p>
+                      <a:endParaRPr lang="en-US" dirty="0"/>
+                    </a:p>
+                    <a:p>
+                      <a:r>
+                        <a:rPr lang="en-US" dirty="0" err="1"/>
+                        <a:t>Compat</a:t>
+                      </a:r>
+                      <a:r>
+                        <a:rPr lang="en-US" dirty="0"/>
+                        <a:t>-discard features</a:t>
+                      </a:r>
+                      <a:r>
+                        <a:rPr lang="en-US" baseline="0" dirty="0"/>
+                        <a:t> (QCOW2): </a:t>
+                      </a:r>
+                      <a:r>
+                        <a:rPr lang="ru-RU" baseline="0" dirty="0"/>
+                        <a:t>старые реализации могут и читать, и писать, но должны обнулить указатели на структуры, которые они не поддерживают.</a:t>
+                      </a:r>
+                    </a:p>
+                    <a:p>
+                      <a:endParaRPr lang="ru-RU" baseline="0" dirty="0"/>
+                    </a:p>
+                    <a:p>
+                      <a:r>
+                        <a:rPr lang="ru-RU" b="1" baseline="0" dirty="0"/>
+                        <a:t>Пример:</a:t>
+                      </a:r>
+                      <a:r>
+                        <a:rPr lang="ru-RU" baseline="0" dirty="0"/>
+                        <a:t> </a:t>
+                      </a:r>
+                      <a:r>
+                        <a:rPr lang="en-US" baseline="0" dirty="0"/>
+                        <a:t>CBT map (Changed Block Tracking map).</a:t>
+                      </a:r>
+                    </a:p>
+                  </a:txBody>
+                  <a:tcPr/>
+                </a:tc>
+                <a:extLst>
+                  <a:ext uri="{0D108BD9-81ED-4DB2-BD59-A6C34878D82A}">
+                    <a16:rowId xmlns:a16="http://schemas.microsoft.com/office/drawing/2014/main" val="10002"/>
                   </a:ext>
                 </a:extLst>
               </a:tr>
@@ -37735,7 +37877,7 @@
     </p:spTree>
     <p:extLst>
       <p:ext uri="{BB962C8B-B14F-4D97-AF65-F5344CB8AC3E}">
-        <p14:creationId xmlns:p14="http://schemas.microsoft.com/office/powerpoint/2010/main" val="4158027989"/>
+        <p14:creationId xmlns:p14="http://schemas.microsoft.com/office/powerpoint/2010/main" val="4252637324"/>
       </p:ext>
     </p:extLst>
   </p:cSld>
@@ -38402,7 +38544,7 @@
           <p:nvPr>
             <p:extLst>
               <p:ext uri="{D42A27DB-BD31-4B8C-83A1-F6EECF244321}">
-                <p14:modId xmlns:p14="http://schemas.microsoft.com/office/powerpoint/2010/main" val="3120347179"/>
+                <p14:modId xmlns:p14="http://schemas.microsoft.com/office/powerpoint/2010/main" val="2009648513"/>
               </p:ext>
             </p:extLst>
           </p:nvPr>
@@ -38456,14 +38598,14 @@
           <p:nvPr>
             <p:extLst>
               <p:ext uri="{D42A27DB-BD31-4B8C-83A1-F6EECF244321}">
-                <p14:modId xmlns:p14="http://schemas.microsoft.com/office/powerpoint/2010/main" val="1281649589"/>
+                <p14:modId xmlns:p14="http://schemas.microsoft.com/office/powerpoint/2010/main" val="63366330"/>
               </p:ext>
             </p:extLst>
           </p:nvPr>
         </p:nvGraphicFramePr>
         <p:xfrm>
           <a:off x="0" y="365762"/>
-          <a:ext cx="12192000" cy="3291840"/>
+          <a:ext cx="12192000" cy="1920240"/>
         </p:xfrm>
         <a:graphic>
           <a:graphicData uri="http://schemas.openxmlformats.org/drawingml/2006/table">
@@ -38528,12 +38670,8 @@
                     <a:lstStyle/>
                     <a:p>
                       <a:r>
-                        <a:rPr lang="en-US" dirty="0" err="1"/>
-                        <a:t>Compat</a:t>
-                      </a:r>
-                      <a:r>
                         <a:rPr lang="en-US" dirty="0"/>
-                        <a:t> features:</a:t>
+                        <a:t>Compat features:</a:t>
                       </a:r>
                       <a:r>
                         <a:rPr lang="ru-RU" dirty="0"/>
@@ -38591,83 +38729,6 @@
                       <a:r>
                         <a:rPr lang="en-US" dirty="0"/>
                         <a:t>EXT4_FEATURE_COMPAT_DIR_INDEX (hash directories)</a:t>
-                      </a:r>
-                    </a:p>
-                    <a:p>
-                      <a:pPr marL="285750" indent="-285750">
-                        <a:buFont typeface="Arial" panose="020B0604020202020204" pitchFamily="34" charset="0"/>
-                        <a:buChar char="•"/>
-                      </a:pPr>
-                      <a:endParaRPr lang="en-US" dirty="0"/>
-                    </a:p>
-                    <a:p>
-                      <a:pPr marL="0" marR="0" indent="0" algn="l" defTabSz="914400" rtl="0" eaLnBrk="1" fontAlgn="auto" latinLnBrk="0" hangingPunct="1">
-                        <a:lnSpc>
-                          <a:spcPct val="100000"/>
-                        </a:lnSpc>
-                        <a:spcBef>
-                          <a:spcPts val="0"/>
-                        </a:spcBef>
-                        <a:spcAft>
-                          <a:spcPts val="0"/>
-                        </a:spcAft>
-                        <a:buClrTx/>
-                        <a:buSzTx/>
-                        <a:buFont typeface="Arial" panose="020B0604020202020204" pitchFamily="34" charset="0"/>
-                        <a:buNone/>
-                        <a:tabLst/>
-                        <a:defRPr/>
-                      </a:pPr>
-                      <a:r>
-                        <a:rPr lang="en-US" dirty="0"/>
-                        <a:t>Ro-</a:t>
-                      </a:r>
-                      <a:r>
-                        <a:rPr lang="en-US" dirty="0" err="1"/>
-                        <a:t>compat</a:t>
-                      </a:r>
-                      <a:r>
-                        <a:rPr lang="en-US" dirty="0"/>
-                        <a:t> features:</a:t>
-                      </a:r>
-                      <a:r>
-                        <a:rPr lang="ru-RU" dirty="0"/>
-                        <a:t> </a:t>
-                      </a:r>
-                      <a:r>
-                        <a:rPr lang="ru-RU" baseline="0" dirty="0"/>
-                        <a:t>старые реализации могут корректно читать такую ФС, но писать в неё уже нет.</a:t>
-                      </a:r>
-                      <a:endParaRPr lang="en-US" dirty="0"/>
-                    </a:p>
-                    <a:p>
-                      <a:pPr marL="285750" indent="-285750">
-                        <a:buFont typeface="Arial" panose="020B0604020202020204" pitchFamily="34" charset="0"/>
-                        <a:buChar char="•"/>
-                      </a:pPr>
-                      <a:r>
-                        <a:rPr lang="en-US" dirty="0"/>
-                        <a:t>EXT4_FEATURE_RO_COMPAT_SPARSE_SUPER</a:t>
-                      </a:r>
-                    </a:p>
-                    <a:p>
-                      <a:pPr marL="285750" indent="-285750">
-                        <a:buFont typeface="Arial" panose="020B0604020202020204" pitchFamily="34" charset="0"/>
-                        <a:buChar char="•"/>
-                      </a:pPr>
-                      <a:r>
-                        <a:rPr lang="en-US" dirty="0"/>
-                        <a:t>EXT4_FEATURE_RO_COMPAT_HUGE_FILE</a:t>
-                      </a:r>
-                    </a:p>
-                    <a:p>
-                      <a:pPr marL="285750" indent="-285750">
-                        <a:buFont typeface="Arial" panose="020B0604020202020204" pitchFamily="34" charset="0"/>
-                        <a:buChar char="•"/>
-                      </a:pPr>
-                      <a:r>
-                        <a:rPr lang="en-US" dirty="0"/>
-                        <a:t>EXT4_FEATURE_RO_COMPAT_QUOTA</a:t>
                       </a:r>
                     </a:p>
                   </a:txBody>
@@ -38686,7 +38747,7 @@
     </p:spTree>
     <p:extLst>
       <p:ext uri="{BB962C8B-B14F-4D97-AF65-F5344CB8AC3E}">
-        <p14:creationId xmlns:p14="http://schemas.microsoft.com/office/powerpoint/2010/main" val="3369271790"/>
+        <p14:creationId xmlns:p14="http://schemas.microsoft.com/office/powerpoint/2010/main" val="4158027989"/>
       </p:ext>
     </p:extLst>
   </p:cSld>
@@ -38778,7 +38839,7 @@
           <p:nvPr>
             <p:extLst>
               <p:ext uri="{D42A27DB-BD31-4B8C-83A1-F6EECF244321}">
-                <p14:modId xmlns:p14="http://schemas.microsoft.com/office/powerpoint/2010/main" val="4064775865"/>
+                <p14:modId xmlns:p14="http://schemas.microsoft.com/office/powerpoint/2010/main" val="3120347179"/>
               </p:ext>
             </p:extLst>
           </p:nvPr>
@@ -38832,14 +38893,14 @@
           <p:nvPr>
             <p:extLst>
               <p:ext uri="{D42A27DB-BD31-4B8C-83A1-F6EECF244321}">
-                <p14:modId xmlns:p14="http://schemas.microsoft.com/office/powerpoint/2010/main" val="1260236965"/>
+                <p14:modId xmlns:p14="http://schemas.microsoft.com/office/powerpoint/2010/main" val="1281649589"/>
               </p:ext>
             </p:extLst>
           </p:nvPr>
         </p:nvGraphicFramePr>
         <p:xfrm>
           <a:off x="0" y="365762"/>
-          <a:ext cx="12192000" cy="5212080"/>
+          <a:ext cx="12192000" cy="3291840"/>
         </p:xfrm>
         <a:graphic>
           <a:graphicData uri="http://schemas.openxmlformats.org/drawingml/2006/table">
@@ -39046,86 +39107,6 @@
                         <a:t>EXT4_FEATURE_RO_COMPAT_QUOTA</a:t>
                       </a:r>
                     </a:p>
-                    <a:p>
-                      <a:pPr marL="285750" indent="-285750">
-                        <a:buFont typeface="Arial" panose="020B0604020202020204" pitchFamily="34" charset="0"/>
-                        <a:buChar char="•"/>
-                      </a:pPr>
-                      <a:endParaRPr lang="en-US" dirty="0"/>
-                    </a:p>
-                    <a:p>
-                      <a:pPr marL="0" indent="0">
-                        <a:buFont typeface="Arial" panose="020B0604020202020204" pitchFamily="34" charset="0"/>
-                        <a:buNone/>
-                      </a:pPr>
-                      <a:r>
-                        <a:rPr lang="en-US" dirty="0" err="1"/>
-                        <a:t>Incompat</a:t>
-                      </a:r>
-                      <a:r>
-                        <a:rPr lang="en-US" dirty="0"/>
-                        <a:t> features:</a:t>
-                      </a:r>
-                      <a:r>
-                        <a:rPr lang="ru-RU" dirty="0"/>
-                        <a:t> </a:t>
-                      </a:r>
-                      <a:r>
-                        <a:rPr lang="ru-RU" baseline="0" dirty="0"/>
-                        <a:t>старые реализации не могут смонтировать такую ФС.</a:t>
-                      </a:r>
-                      <a:endParaRPr lang="en-US" dirty="0"/>
-                    </a:p>
-                    <a:p>
-                      <a:pPr marL="285750" indent="-285750">
-                        <a:buFont typeface="Arial" panose="020B0604020202020204" pitchFamily="34" charset="0"/>
-                        <a:buChar char="•"/>
-                      </a:pPr>
-                      <a:r>
-                        <a:rPr lang="en-US" dirty="0"/>
-                        <a:t>EXT4_FEATURE_INCOMPAT_COMPRESSION</a:t>
-                      </a:r>
-                    </a:p>
-                    <a:p>
-                      <a:pPr marL="285750" indent="-285750">
-                        <a:buFont typeface="Arial" panose="020B0604020202020204" pitchFamily="34" charset="0"/>
-                        <a:buChar char="•"/>
-                      </a:pPr>
-                      <a:r>
-                        <a:rPr lang="en-US" dirty="0"/>
-                        <a:t>EXT4_FEATURE_INCOMPAT_JOURNAL_DEV</a:t>
-                      </a:r>
-                    </a:p>
-                    <a:p>
-                      <a:pPr marL="285750" indent="-285750">
-                        <a:buFont typeface="Arial" panose="020B0604020202020204" pitchFamily="34" charset="0"/>
-                        <a:buChar char="•"/>
-                      </a:pPr>
-                      <a:r>
-                        <a:rPr lang="en-US" dirty="0"/>
-                        <a:t>EXT4_FEATURE_INCOMPAT_EXTENTS</a:t>
-                      </a:r>
-                    </a:p>
-                    <a:p>
-                      <a:pPr marL="285750" indent="-285750">
-                        <a:buFont typeface="Arial" panose="020B0604020202020204" pitchFamily="34" charset="0"/>
-                        <a:buChar char="•"/>
-                      </a:pPr>
-                      <a:r>
-                        <a:rPr lang="en-US" dirty="0"/>
-                        <a:t>EXT4_FEATURE_INCOMPAT_INLINE_DATA</a:t>
-                      </a:r>
-                    </a:p>
-                    <a:p>
-                      <a:pPr marL="285750" indent="-285750">
-                        <a:buFont typeface="Arial" panose="020B0604020202020204" pitchFamily="34" charset="0"/>
-                        <a:buChar char="•"/>
-                      </a:pPr>
-                      <a:r>
-                        <a:rPr lang="en-US" dirty="0"/>
-                        <a:t>EXT4_FEATURE_INCOMPAT_ENCRYPT</a:t>
-                      </a:r>
-                    </a:p>
                   </a:txBody>
                   <a:tcPr/>
                 </a:tc>
@@ -39142,7 +39123,7 @@
     </p:spTree>
     <p:extLst>
       <p:ext uri="{BB962C8B-B14F-4D97-AF65-F5344CB8AC3E}">
-        <p14:creationId xmlns:p14="http://schemas.microsoft.com/office/powerpoint/2010/main" val="3658423966"/>
+        <p14:creationId xmlns:p14="http://schemas.microsoft.com/office/powerpoint/2010/main" val="3369271790"/>
       </p:ext>
     </p:extLst>
   </p:cSld>
@@ -39234,7 +39215,7 @@
           <p:nvPr>
             <p:extLst>
               <p:ext uri="{D42A27DB-BD31-4B8C-83A1-F6EECF244321}">
-                <p14:modId xmlns:p14="http://schemas.microsoft.com/office/powerpoint/2010/main" val="2576990835"/>
+                <p14:modId xmlns:p14="http://schemas.microsoft.com/office/powerpoint/2010/main" val="4064775865"/>
               </p:ext>
             </p:extLst>
           </p:nvPr>
@@ -39285,11 +39266,17 @@
           <p:cNvGraphicFramePr>
             <a:graphicFrameLocks noGrp="1"/>
           </p:cNvGraphicFramePr>
-          <p:nvPr/>
+          <p:nvPr>
+            <p:extLst>
+              <p:ext uri="{D42A27DB-BD31-4B8C-83A1-F6EECF244321}">
+                <p14:modId xmlns:p14="http://schemas.microsoft.com/office/powerpoint/2010/main" val="1260236965"/>
+              </p:ext>
+            </p:extLst>
+          </p:nvPr>
         </p:nvGraphicFramePr>
         <p:xfrm>
-          <a:off x="0" y="365761"/>
-          <a:ext cx="12192000" cy="6035040"/>
+          <a:off x="0" y="365762"/>
+          <a:ext cx="12192000" cy="5212080"/>
         </p:xfrm>
         <a:graphic>
           <a:graphicData uri="http://schemas.openxmlformats.org/drawingml/2006/table">
@@ -39306,55 +39293,35 @@
                   </a:extLst>
                 </a:gridCol>
               </a:tblGrid>
-              <a:tr h="143732">
-                <a:tc>
-                  <a:txBody>
-                    <a:bodyPr/>
-                    <a:lstStyle/>
-                    <a:p>
-                      <a:r>
-                        <a:rPr lang="ru-RU" sz="2400" dirty="0"/>
-                        <a:t>Пример </a:t>
+              <a:tr h="0">
+                <a:tc>
+                  <a:txBody>
+                    <a:bodyPr/>
+                    <a:lstStyle/>
+                    <a:p>
+                      <a:r>
+                        <a:rPr lang="en-US" sz="2400" dirty="0" err="1"/>
+                        <a:t>Compat</a:t>
                       </a:r>
                       <a:r>
                         <a:rPr lang="en-US" sz="2400" dirty="0"/>
-                        <a:t>(</a:t>
-                      </a:r>
-                      <a:r>
-                        <a:rPr lang="ru-RU" sz="2400" dirty="0"/>
-                        <a:t>почти) </a:t>
+                        <a:t>, </a:t>
                       </a:r>
                       <a:r>
                         <a:rPr lang="en-US" sz="2400" dirty="0" err="1"/>
-                        <a:t>compat</a:t>
+                        <a:t>ro-compat</a:t>
                       </a:r>
                       <a:r>
                         <a:rPr lang="en-US" sz="2400" dirty="0"/>
-                        <a:t> feature: 32-</a:t>
-                      </a:r>
-                      <a:r>
-                        <a:rPr lang="ru-RU" sz="2400" dirty="0"/>
-                        <a:t>битные </a:t>
+                        <a:t>, </a:t>
+                      </a:r>
+                      <a:r>
+                        <a:rPr lang="en-US" sz="2400" dirty="0" err="1"/>
+                        <a:t>incompat</a:t>
                       </a:r>
                       <a:r>
                         <a:rPr lang="en-US" sz="2400" dirty="0"/>
-                        <a:t>UID </a:t>
-                      </a:r>
-                      <a:r>
-                        <a:rPr lang="ru-RU" sz="2400" dirty="0"/>
-                        <a:t>и</a:t>
-                      </a:r>
-                      <a:r>
-                        <a:rPr lang="ru-RU" sz="2400" baseline="0" dirty="0"/>
-                        <a:t> </a:t>
-                      </a:r>
-                      <a:r>
-                        <a:rPr lang="en-US" sz="2400" baseline="0" dirty="0"/>
-                        <a:t>GID </a:t>
-                      </a:r>
-                      <a:r>
-                        <a:rPr lang="ru-RU" sz="2400" baseline="0" dirty="0"/>
-                        <a:t>владельца</a:t>
+                        <a:t> features</a:t>
                       </a:r>
                       <a:endParaRPr lang="ru-RU" sz="2400" dirty="0"/>
                     </a:p>
@@ -39374,98 +39341,227 @@
                     <a:lstStyle/>
                     <a:p>
                       <a:r>
+                        <a:rPr lang="en-US" dirty="0" err="1"/>
+                        <a:t>Compat</a:t>
+                      </a:r>
+                      <a:r>
+                        <a:rPr lang="en-US" dirty="0"/>
+                        <a:t> features:</a:t>
+                      </a:r>
+                      <a:r>
                         <a:rPr lang="ru-RU" dirty="0"/>
-                        <a:t>Напоминание: хвост</a:t>
+                        <a:t> </a:t>
                       </a:r>
                       <a:r>
                         <a:rPr lang="ru-RU" baseline="0" dirty="0"/>
+                        <a:t>старые реализации </a:t>
+                      </a:r>
+                      <a:r>
+                        <a:rPr lang="en-US" baseline="0" dirty="0"/>
+                        <a:t>ext2 </a:t>
+                      </a:r>
+                      <a:r>
+                        <a:rPr lang="ru-RU" baseline="0" dirty="0"/>
+                        <a:t>могут и читать, и писать на такую файловую систему.</a:t>
+                      </a:r>
+                      <a:endParaRPr lang="en-US" dirty="0"/>
+                    </a:p>
+                    <a:p>
+                      <a:pPr marL="285750" indent="-285750">
+                        <a:buFont typeface="Arial" panose="020B0604020202020204" pitchFamily="34" charset="0"/>
+                        <a:buChar char="•"/>
+                      </a:pPr>
+                      <a:r>
+                        <a:rPr lang="en-US" dirty="0"/>
+                        <a:t>EXT4_FEATURE_COMPAT_DIR_PREALLOC</a:t>
+                      </a:r>
+                    </a:p>
+                    <a:p>
+                      <a:pPr marL="285750" indent="-285750">
+                        <a:buFont typeface="Arial" panose="020B0604020202020204" pitchFamily="34" charset="0"/>
+                        <a:buChar char="•"/>
+                      </a:pPr>
+                      <a:r>
+                        <a:rPr lang="en-US" dirty="0"/>
+                        <a:t>EXT4_FEATURE_COMPAT_HAS_JOURNAL</a:t>
+                      </a:r>
+                    </a:p>
+                    <a:p>
+                      <a:pPr marL="285750" indent="-285750">
+                        <a:buFont typeface="Arial" panose="020B0604020202020204" pitchFamily="34" charset="0"/>
+                        <a:buChar char="•"/>
+                      </a:pPr>
+                      <a:r>
+                        <a:rPr lang="en-US" dirty="0"/>
+                        <a:t>EXT4_FEATURE_COMPAT_EXT_ATTR</a:t>
+                      </a:r>
+                    </a:p>
+                    <a:p>
+                      <a:pPr marL="285750" indent="-285750">
+                        <a:buFont typeface="Arial" panose="020B0604020202020204" pitchFamily="34" charset="0"/>
+                        <a:buChar char="•"/>
+                      </a:pPr>
+                      <a:r>
+                        <a:rPr lang="en-US" dirty="0"/>
+                        <a:t>EXT4_FEATURE_COMPAT_DIR_INDEX (hash directories)</a:t>
+                      </a:r>
+                    </a:p>
+                    <a:p>
+                      <a:pPr marL="285750" indent="-285750">
+                        <a:buFont typeface="Arial" panose="020B0604020202020204" pitchFamily="34" charset="0"/>
+                        <a:buChar char="•"/>
+                      </a:pPr>
+                      <a:endParaRPr lang="en-US" dirty="0"/>
+                    </a:p>
+                    <a:p>
+                      <a:pPr marL="0" marR="0" indent="0" algn="l" defTabSz="914400" rtl="0" eaLnBrk="1" fontAlgn="auto" latinLnBrk="0" hangingPunct="1">
+                        <a:lnSpc>
+                          <a:spcPct val="100000"/>
+                        </a:lnSpc>
+                        <a:spcBef>
+                          <a:spcPts val="0"/>
+                        </a:spcBef>
+                        <a:spcAft>
+                          <a:spcPts val="0"/>
+                        </a:spcAft>
+                        <a:buClrTx/>
+                        <a:buSzTx/>
+                        <a:buFont typeface="Arial" panose="020B0604020202020204" pitchFamily="34" charset="0"/>
+                        <a:buNone/>
+                        <a:tabLst/>
+                        <a:defRPr/>
+                      </a:pPr>
+                      <a:r>
+                        <a:rPr lang="en-US" dirty="0"/>
+                        <a:t>Ro-</a:t>
+                      </a:r>
+                      <a:r>
+                        <a:rPr lang="en-US" dirty="0" err="1"/>
+                        <a:t>compat</a:t>
+                      </a:r>
+                      <a:r>
+                        <a:rPr lang="en-US" dirty="0"/>
+                        <a:t> features:</a:t>
+                      </a:r>
+                      <a:r>
+                        <a:rPr lang="ru-RU" dirty="0"/>
                         <a:t> </a:t>
                       </a:r>
                       <a:r>
-                        <a:rPr lang="en-US" baseline="0" dirty="0" err="1"/>
-                        <a:t>struct</a:t>
-                      </a:r>
-                      <a:r>
-                        <a:rPr lang="en-US" baseline="0" dirty="0"/>
-                        <a:t> ext2_inode </a:t>
-                      </a:r>
-                      <a:r>
                         <a:rPr lang="ru-RU" baseline="0" dirty="0"/>
-                        <a:t>выглядит так:</a:t>
-                      </a:r>
-                    </a:p>
-                    <a:p>
-                      <a:endParaRPr lang="ru-RU" baseline="0" dirty="0"/>
-                    </a:p>
-                    <a:p>
-                      <a:endParaRPr lang="ru-RU" baseline="0" dirty="0"/>
-                    </a:p>
-                    <a:p>
-                      <a:endParaRPr lang="ru-RU" baseline="0" dirty="0"/>
-                    </a:p>
-                    <a:p>
-                      <a:endParaRPr lang="en-US" baseline="0" dirty="0"/>
-                    </a:p>
-                    <a:p>
-                      <a:endParaRPr lang="en-US" baseline="0" dirty="0"/>
-                    </a:p>
-                    <a:p>
-                      <a:endParaRPr lang="en-US" baseline="0" dirty="0"/>
-                    </a:p>
-                    <a:p>
-                      <a:endParaRPr lang="en-US" baseline="0" dirty="0"/>
-                    </a:p>
-                    <a:p>
-                      <a:endParaRPr lang="ru-RU" baseline="0" dirty="0"/>
-                    </a:p>
-                    <a:p>
+                        <a:t>старые реализации могут корректно читать такую ФС, но писать в неё уже нет.</a:t>
+                      </a:r>
                       <a:endParaRPr lang="en-US" dirty="0"/>
                     </a:p>
                     <a:p>
+                      <a:pPr marL="285750" indent="-285750">
+                        <a:buFont typeface="Arial" panose="020B0604020202020204" pitchFamily="34" charset="0"/>
+                        <a:buChar char="•"/>
+                      </a:pPr>
+                      <a:r>
+                        <a:rPr lang="en-US" dirty="0"/>
+                        <a:t>EXT4_FEATURE_RO_COMPAT_SPARSE_SUPER</a:t>
+                      </a:r>
+                    </a:p>
+                    <a:p>
+                      <a:pPr marL="285750" indent="-285750">
+                        <a:buFont typeface="Arial" panose="020B0604020202020204" pitchFamily="34" charset="0"/>
+                        <a:buChar char="•"/>
+                      </a:pPr>
+                      <a:r>
+                        <a:rPr lang="en-US" dirty="0"/>
+                        <a:t>EXT4_FEATURE_RO_COMPAT_HUGE_FILE</a:t>
+                      </a:r>
+                    </a:p>
+                    <a:p>
+                      <a:pPr marL="285750" indent="-285750">
+                        <a:buFont typeface="Arial" panose="020B0604020202020204" pitchFamily="34" charset="0"/>
+                        <a:buChar char="•"/>
+                      </a:pPr>
+                      <a:r>
+                        <a:rPr lang="en-US" dirty="0"/>
+                        <a:t>EXT4_FEATURE_RO_COMPAT_QUOTA</a:t>
+                      </a:r>
+                    </a:p>
+                    <a:p>
+                      <a:pPr marL="285750" indent="-285750">
+                        <a:buFont typeface="Arial" panose="020B0604020202020204" pitchFamily="34" charset="0"/>
+                        <a:buChar char="•"/>
+                      </a:pPr>
+                      <a:endParaRPr lang="en-US" dirty="0"/>
+                    </a:p>
+                    <a:p>
+                      <a:pPr marL="0" indent="0">
+                        <a:buFont typeface="Arial" panose="020B0604020202020204" pitchFamily="34" charset="0"/>
+                        <a:buNone/>
+                      </a:pPr>
+                      <a:r>
+                        <a:rPr lang="en-US" dirty="0" err="1"/>
+                        <a:t>Incompat</a:t>
+                      </a:r>
+                      <a:r>
+                        <a:rPr lang="en-US" dirty="0"/>
+                        <a:t> features:</a:t>
+                      </a:r>
                       <a:r>
                         <a:rPr lang="ru-RU" dirty="0"/>
-                        <a:t>Операционные</a:t>
+                        <a:t> </a:t>
                       </a:r>
                       <a:r>
                         <a:rPr lang="ru-RU" baseline="0" dirty="0"/>
-                        <a:t> системы, которые не используют поле </a:t>
-                      </a:r>
-                      <a:r>
-                        <a:rPr lang="en-US" baseline="0" dirty="0"/>
-                        <a:t>osd2, </a:t>
-                      </a:r>
-                      <a:r>
-                        <a:rPr lang="ru-RU" baseline="0" dirty="0"/>
-                        <a:t>должны сохранять его без изменений.</a:t>
-                      </a:r>
-                      <a:endParaRPr lang="en-US" baseline="0" dirty="0"/>
-                    </a:p>
-                    <a:p>
-                      <a:endParaRPr lang="en-US" baseline="0" dirty="0"/>
-                    </a:p>
-                    <a:p>
-                      <a:endParaRPr lang="en-US" baseline="0" dirty="0"/>
-                    </a:p>
-                    <a:p>
-                      <a:endParaRPr lang="en-US" baseline="0" dirty="0"/>
-                    </a:p>
-                    <a:p>
-                      <a:endParaRPr lang="en-US" baseline="0" dirty="0"/>
-                    </a:p>
-                    <a:p>
-                      <a:endParaRPr lang="en-US" baseline="0" dirty="0"/>
-                    </a:p>
-                    <a:p>
-                      <a:endParaRPr lang="en-US" baseline="0" dirty="0"/>
-                    </a:p>
-                    <a:p>
-                      <a:endParaRPr lang="en-US" baseline="0" dirty="0"/>
-                    </a:p>
-                    <a:p>
-                      <a:endParaRPr lang="en-US" baseline="0" dirty="0"/>
-                    </a:p>
-                    <a:p>
-                      <a:endParaRPr lang="ru-RU" dirty="0"/>
+                        <a:t>старые реализации не могут смонтировать такую ФС.</a:t>
+                      </a:r>
+                      <a:endParaRPr lang="en-US" dirty="0"/>
+                    </a:p>
+                    <a:p>
+                      <a:pPr marL="285750" indent="-285750">
+                        <a:buFont typeface="Arial" panose="020B0604020202020204" pitchFamily="34" charset="0"/>
+                        <a:buChar char="•"/>
+                      </a:pPr>
+                      <a:r>
+                        <a:rPr lang="en-US" dirty="0"/>
+                        <a:t>EXT4_FEATURE_INCOMPAT_COMPRESSION</a:t>
+                      </a:r>
+                    </a:p>
+                    <a:p>
+                      <a:pPr marL="285750" indent="-285750">
+                        <a:buFont typeface="Arial" panose="020B0604020202020204" pitchFamily="34" charset="0"/>
+                        <a:buChar char="•"/>
+                      </a:pPr>
+                      <a:r>
+                        <a:rPr lang="en-US" dirty="0"/>
+                        <a:t>EXT4_FEATURE_INCOMPAT_JOURNAL_DEV</a:t>
+                      </a:r>
+                    </a:p>
+                    <a:p>
+                      <a:pPr marL="285750" indent="-285750">
+                        <a:buFont typeface="Arial" panose="020B0604020202020204" pitchFamily="34" charset="0"/>
+                        <a:buChar char="•"/>
+                      </a:pPr>
+                      <a:r>
+                        <a:rPr lang="en-US" dirty="0"/>
+                        <a:t>EXT4_FEATURE_INCOMPAT_EXTENTS</a:t>
+                      </a:r>
+                    </a:p>
+                    <a:p>
+                      <a:pPr marL="285750" indent="-285750">
+                        <a:buFont typeface="Arial" panose="020B0604020202020204" pitchFamily="34" charset="0"/>
+                        <a:buChar char="•"/>
+                      </a:pPr>
+                      <a:r>
+                        <a:rPr lang="en-US" dirty="0"/>
+                        <a:t>EXT4_FEATURE_INCOMPAT_INLINE_DATA</a:t>
+                      </a:r>
+                    </a:p>
+                    <a:p>
+                      <a:pPr marL="285750" indent="-285750">
+                        <a:buFont typeface="Arial" panose="020B0604020202020204" pitchFamily="34" charset="0"/>
+                        <a:buChar char="•"/>
+                      </a:pPr>
+                      <a:r>
+                        <a:rPr lang="en-US" dirty="0"/>
+                        <a:t>EXT4_FEATURE_INCOMPAT_ENCRYPT</a:t>
+                      </a:r>
                     </a:p>
                   </a:txBody>
                   <a:tcPr/>
@@ -39480,178 +39576,10 @@
           </a:graphicData>
         </a:graphic>
       </p:graphicFrame>
-      <p:sp>
-        <p:nvSpPr>
-          <p:cNvPr id="4" name="TextBox 3">
-            <a:extLst>
-              <a:ext uri="{FF2B5EF4-FFF2-40B4-BE49-F238E27FC236}">
-                <a16:creationId xmlns:a16="http://schemas.microsoft.com/office/drawing/2014/main" id="{7B10B2BA-A790-8C44-865A-00C66CAE89D4}"/>
-              </a:ext>
-            </a:extLst>
-          </p:cNvPr>
-          <p:cNvSpPr txBox="1"/>
-          <p:nvPr/>
-        </p:nvSpPr>
-        <p:spPr>
-          <a:xfrm>
-            <a:off x="2014594" y="1351955"/>
-            <a:ext cx="8162812" cy="2031325"/>
-          </a:xfrm>
-          <a:prstGeom prst="rect">
-            <a:avLst/>
-          </a:prstGeom>
-          <a:solidFill>
-            <a:schemeClr val="bg1"/>
-          </a:solidFill>
-        </p:spPr>
-        <p:txBody>
-          <a:bodyPr wrap="none" rtlCol="0">
-            <a:spAutoFit/>
-          </a:bodyPr>
-          <a:lstStyle/>
-          <a:p>
-            <a:r>
-              <a:rPr lang="en-US" dirty="0">
-                <a:latin typeface="Consolas" panose="020B0609020204030204" pitchFamily="49" charset="0"/>
-                <a:cs typeface="Consolas" panose="020B0609020204030204" pitchFamily="49" charset="0"/>
-              </a:rPr>
-              <a:t>        __le32  </a:t>
-            </a:r>
-            <a:r>
-              <a:rPr lang="en-US" dirty="0" err="1">
-                <a:latin typeface="Consolas" panose="020B0609020204030204" pitchFamily="49" charset="0"/>
-                <a:cs typeface="Consolas" panose="020B0609020204030204" pitchFamily="49" charset="0"/>
-              </a:rPr>
-              <a:t>i_block</a:t>
-            </a:r>
-            <a:r>
-              <a:rPr lang="en-US" dirty="0">
-                <a:latin typeface="Consolas" panose="020B0609020204030204" pitchFamily="49" charset="0"/>
-                <a:cs typeface="Consolas" panose="020B0609020204030204" pitchFamily="49" charset="0"/>
-              </a:rPr>
-              <a:t>[EXT2_N_BLOCKS];/* Pointers to blocks */</a:t>
-            </a:r>
-          </a:p>
-          <a:p>
-            <a:r>
-              <a:rPr lang="en-US" dirty="0">
-                <a:latin typeface="Consolas" panose="020B0609020204030204" pitchFamily="49" charset="0"/>
-                <a:cs typeface="Consolas" panose="020B0609020204030204" pitchFamily="49" charset="0"/>
-              </a:rPr>
-              <a:t>        __le32  </a:t>
-            </a:r>
-            <a:r>
-              <a:rPr lang="en-US" dirty="0" err="1">
-                <a:latin typeface="Consolas" panose="020B0609020204030204" pitchFamily="49" charset="0"/>
-                <a:cs typeface="Consolas" panose="020B0609020204030204" pitchFamily="49" charset="0"/>
-              </a:rPr>
-              <a:t>i_generation</a:t>
-            </a:r>
-            <a:r>
-              <a:rPr lang="en-US" dirty="0">
-                <a:latin typeface="Consolas" panose="020B0609020204030204" pitchFamily="49" charset="0"/>
-                <a:cs typeface="Consolas" panose="020B0609020204030204" pitchFamily="49" charset="0"/>
-              </a:rPr>
-              <a:t>;   /* File version (for NFS) */</a:t>
-            </a:r>
-          </a:p>
-          <a:p>
-            <a:r>
-              <a:rPr lang="en-US" dirty="0">
-                <a:latin typeface="Consolas" panose="020B0609020204030204" pitchFamily="49" charset="0"/>
-                <a:cs typeface="Consolas" panose="020B0609020204030204" pitchFamily="49" charset="0"/>
-              </a:rPr>
-              <a:t>        __le32  </a:t>
-            </a:r>
-            <a:r>
-              <a:rPr lang="en-US" dirty="0" err="1">
-                <a:latin typeface="Consolas" panose="020B0609020204030204" pitchFamily="49" charset="0"/>
-                <a:cs typeface="Consolas" panose="020B0609020204030204" pitchFamily="49" charset="0"/>
-              </a:rPr>
-              <a:t>i_file_acl</a:t>
-            </a:r>
-            <a:r>
-              <a:rPr lang="en-US" dirty="0">
-                <a:latin typeface="Consolas" panose="020B0609020204030204" pitchFamily="49" charset="0"/>
-                <a:cs typeface="Consolas" panose="020B0609020204030204" pitchFamily="49" charset="0"/>
-              </a:rPr>
-              <a:t>;     /* File ACL */</a:t>
-            </a:r>
-          </a:p>
-          <a:p>
-            <a:r>
-              <a:rPr lang="en-US" dirty="0">
-                <a:latin typeface="Consolas" panose="020B0609020204030204" pitchFamily="49" charset="0"/>
-                <a:cs typeface="Consolas" panose="020B0609020204030204" pitchFamily="49" charset="0"/>
-              </a:rPr>
-              <a:t>        __le32  </a:t>
-            </a:r>
-            <a:r>
-              <a:rPr lang="en-US" dirty="0" err="1">
-                <a:latin typeface="Consolas" panose="020B0609020204030204" pitchFamily="49" charset="0"/>
-                <a:cs typeface="Consolas" panose="020B0609020204030204" pitchFamily="49" charset="0"/>
-              </a:rPr>
-              <a:t>i_dir_acl</a:t>
-            </a:r>
-            <a:r>
-              <a:rPr lang="en-US" dirty="0">
-                <a:latin typeface="Consolas" panose="020B0609020204030204" pitchFamily="49" charset="0"/>
-                <a:cs typeface="Consolas" panose="020B0609020204030204" pitchFamily="49" charset="0"/>
-              </a:rPr>
-              <a:t>;      /* Directory ACL */</a:t>
-            </a:r>
-          </a:p>
-          <a:p>
-            <a:r>
-              <a:rPr lang="en-US" dirty="0">
-                <a:latin typeface="Consolas" panose="020B0609020204030204" pitchFamily="49" charset="0"/>
-                <a:cs typeface="Consolas" panose="020B0609020204030204" pitchFamily="49" charset="0"/>
-              </a:rPr>
-              <a:t>        __le32  </a:t>
-            </a:r>
-            <a:r>
-              <a:rPr lang="en-US" dirty="0" err="1">
-                <a:latin typeface="Consolas" panose="020B0609020204030204" pitchFamily="49" charset="0"/>
-                <a:cs typeface="Consolas" panose="020B0609020204030204" pitchFamily="49" charset="0"/>
-              </a:rPr>
-              <a:t>i_faddr</a:t>
-            </a:r>
-            <a:r>
-              <a:rPr lang="en-US" dirty="0">
-                <a:latin typeface="Consolas" panose="020B0609020204030204" pitchFamily="49" charset="0"/>
-                <a:cs typeface="Consolas" panose="020B0609020204030204" pitchFamily="49" charset="0"/>
-              </a:rPr>
-              <a:t>;        /* Fragment address */</a:t>
-            </a:r>
-          </a:p>
-          <a:p>
-            <a:r>
-              <a:rPr lang="en-US" dirty="0">
-                <a:latin typeface="Consolas" panose="020B0609020204030204" pitchFamily="49" charset="0"/>
-                <a:cs typeface="Consolas" panose="020B0609020204030204" pitchFamily="49" charset="0"/>
-              </a:rPr>
-              <a:t>        __le8   i_osd2[12];</a:t>
-            </a:r>
-          </a:p>
-          <a:p>
-            <a:r>
-              <a:rPr lang="en-US" dirty="0">
-                <a:latin typeface="Consolas" panose="020B0609020204030204" pitchFamily="49" charset="0"/>
-                <a:cs typeface="Consolas" panose="020B0609020204030204" pitchFamily="49" charset="0"/>
-              </a:rPr>
-              <a:t>};</a:t>
-            </a:r>
-            <a:endParaRPr lang="ru-RU" dirty="0">
-              <a:latin typeface="Consolas" panose="020B0609020204030204" pitchFamily="49" charset="0"/>
-              <a:cs typeface="Consolas" panose="020B0609020204030204" pitchFamily="49" charset="0"/>
-            </a:endParaRPr>
-          </a:p>
-        </p:txBody>
-      </p:sp>
     </p:spTree>
     <p:extLst>
       <p:ext uri="{BB962C8B-B14F-4D97-AF65-F5344CB8AC3E}">
-        <p14:creationId xmlns:p14="http://schemas.microsoft.com/office/powerpoint/2010/main" val="3641872543"/>
+        <p14:creationId xmlns:p14="http://schemas.microsoft.com/office/powerpoint/2010/main" val="3658423966"/>
       </p:ext>
     </p:extLst>
   </p:cSld>
@@ -39743,7 +39671,7 @@
           <p:nvPr>
             <p:extLst>
               <p:ext uri="{D42A27DB-BD31-4B8C-83A1-F6EECF244321}">
-                <p14:modId xmlns:p14="http://schemas.microsoft.com/office/powerpoint/2010/main" val="3653435508"/>
+                <p14:modId xmlns:p14="http://schemas.microsoft.com/office/powerpoint/2010/main" val="2576990835"/>
               </p:ext>
             </p:extLst>
           </p:nvPr>
@@ -39884,15 +39812,7 @@
                     <a:p>
                       <a:r>
                         <a:rPr lang="ru-RU" dirty="0"/>
-                        <a:t>Для </a:t>
-                      </a:r>
-                      <a:r>
-                        <a:rPr lang="en-US" dirty="0" err="1"/>
-                        <a:t>linux</a:t>
-                      </a:r>
-                      <a:r>
-                        <a:rPr lang="ru-RU" dirty="0"/>
-                        <a:t> хвост</a:t>
+                        <a:t>Напоминание: хвост</a:t>
                       </a:r>
                       <a:r>
                         <a:rPr lang="ru-RU" baseline="0" dirty="0"/>
@@ -39933,6 +39853,28 @@
                       <a:endParaRPr lang="en-US" baseline="0" dirty="0"/>
                     </a:p>
                     <a:p>
+                      <a:endParaRPr lang="ru-RU" baseline="0" dirty="0"/>
+                    </a:p>
+                    <a:p>
+                      <a:endParaRPr lang="en-US" dirty="0"/>
+                    </a:p>
+                    <a:p>
+                      <a:r>
+                        <a:rPr lang="ru-RU" dirty="0"/>
+                        <a:t>Операционные</a:t>
+                      </a:r>
+                      <a:r>
+                        <a:rPr lang="ru-RU" baseline="0" dirty="0"/>
+                        <a:t> системы, которые не используют поле </a:t>
+                      </a:r>
+                      <a:r>
+                        <a:rPr lang="en-US" baseline="0" dirty="0"/>
+                        <a:t>osd2, </a:t>
+                      </a:r>
+                      <a:r>
+                        <a:rPr lang="ru-RU" baseline="0" dirty="0"/>
+                        <a:t>должны сохранять его без изменений.</a:t>
+                      </a:r>
                       <a:endParaRPr lang="en-US" baseline="0" dirty="0"/>
                     </a:p>
                     <a:p>
@@ -39960,13 +39902,7 @@
                       <a:endParaRPr lang="en-US" baseline="0" dirty="0"/>
                     </a:p>
                     <a:p>
-                      <a:endParaRPr lang="en-US" baseline="0" dirty="0"/>
-                    </a:p>
-                    <a:p>
-                      <a:endParaRPr lang="en-US" baseline="0" dirty="0"/>
-                    </a:p>
-                    <a:p>
-                      <a:endParaRPr lang="en-US" baseline="0" dirty="0"/>
+                      <a:endParaRPr lang="ru-RU" dirty="0"/>
                     </a:p>
                   </a:txBody>
                   <a:tcPr/>
@@ -39983,10 +39919,10 @@
       </p:graphicFrame>
       <p:sp>
         <p:nvSpPr>
-          <p:cNvPr id="3" name="TextBox 2">
+          <p:cNvPr id="4" name="TextBox 3">
             <a:extLst>
               <a:ext uri="{FF2B5EF4-FFF2-40B4-BE49-F238E27FC236}">
-                <a16:creationId xmlns:a16="http://schemas.microsoft.com/office/drawing/2014/main" id="{1C73EA6D-1593-6C4B-A670-CEDED90ADCFB}"/>
+                <a16:creationId xmlns:a16="http://schemas.microsoft.com/office/drawing/2014/main" id="{7B10B2BA-A790-8C44-865A-00C66CAE89D4}"/>
               </a:ext>
             </a:extLst>
           </p:cNvPr>
@@ -39995,8 +39931,8 @@
         </p:nvSpPr>
         <p:spPr>
           <a:xfrm>
-            <a:off x="1508045" y="1349827"/>
-            <a:ext cx="9175910" cy="4524315"/>
+            <a:off x="2014594" y="1351955"/>
+            <a:ext cx="8162812" cy="2031325"/>
           </a:xfrm>
           <a:prstGeom prst="rect">
             <a:avLst/>
@@ -40131,144 +40067,7 @@
                 <a:latin typeface="Consolas" panose="020B0609020204030204" pitchFamily="49" charset="0"/>
                 <a:cs typeface="Consolas" panose="020B0609020204030204" pitchFamily="49" charset="0"/>
               </a:rPr>
-              <a:t>        union {</a:t>
-            </a:r>
-          </a:p>
-          <a:p>
-            <a:r>
-              <a:rPr lang="en-US" dirty="0">
-                <a:latin typeface="Consolas" panose="020B0609020204030204" pitchFamily="49" charset="0"/>
-                <a:cs typeface="Consolas" panose="020B0609020204030204" pitchFamily="49" charset="0"/>
-              </a:rPr>
-              <a:t>                struct {</a:t>
-            </a:r>
-          </a:p>
-          <a:p>
-            <a:r>
-              <a:rPr lang="en-US" dirty="0">
-                <a:latin typeface="Consolas" panose="020B0609020204030204" pitchFamily="49" charset="0"/>
-                <a:cs typeface="Consolas" panose="020B0609020204030204" pitchFamily="49" charset="0"/>
-              </a:rPr>
-              <a:t>                        __u8    </a:t>
-            </a:r>
-            <a:r>
-              <a:rPr lang="en-US" dirty="0" err="1">
-                <a:latin typeface="Consolas" panose="020B0609020204030204" pitchFamily="49" charset="0"/>
-                <a:cs typeface="Consolas" panose="020B0609020204030204" pitchFamily="49" charset="0"/>
-              </a:rPr>
-              <a:t>l_i_frag</a:t>
-            </a:r>
-            <a:r>
-              <a:rPr lang="en-US" dirty="0">
-                <a:latin typeface="Consolas" panose="020B0609020204030204" pitchFamily="49" charset="0"/>
-                <a:cs typeface="Consolas" panose="020B0609020204030204" pitchFamily="49" charset="0"/>
-              </a:rPr>
-              <a:t>;       /* Fragment number */</a:t>
-            </a:r>
-          </a:p>
-          <a:p>
-            <a:r>
-              <a:rPr lang="en-US" dirty="0">
-                <a:latin typeface="Consolas" panose="020B0609020204030204" pitchFamily="49" charset="0"/>
-                <a:cs typeface="Consolas" panose="020B0609020204030204" pitchFamily="49" charset="0"/>
-              </a:rPr>
-              <a:t>                        __u8    </a:t>
-            </a:r>
-            <a:r>
-              <a:rPr lang="en-US" dirty="0" err="1">
-                <a:latin typeface="Consolas" panose="020B0609020204030204" pitchFamily="49" charset="0"/>
-                <a:cs typeface="Consolas" panose="020B0609020204030204" pitchFamily="49" charset="0"/>
-              </a:rPr>
-              <a:t>l_i_fsize</a:t>
-            </a:r>
-            <a:r>
-              <a:rPr lang="en-US" dirty="0">
-                <a:latin typeface="Consolas" panose="020B0609020204030204" pitchFamily="49" charset="0"/>
-                <a:cs typeface="Consolas" panose="020B0609020204030204" pitchFamily="49" charset="0"/>
-              </a:rPr>
-              <a:t>;      /* Fragment size */</a:t>
-            </a:r>
-          </a:p>
-          <a:p>
-            <a:r>
-              <a:rPr lang="en-US" dirty="0">
-                <a:latin typeface="Consolas" panose="020B0609020204030204" pitchFamily="49" charset="0"/>
-                <a:cs typeface="Consolas" panose="020B0609020204030204" pitchFamily="49" charset="0"/>
-              </a:rPr>
-              <a:t>                        __u16   i_pad1;</a:t>
-            </a:r>
-          </a:p>
-          <a:p>
-            <a:r>
-              <a:rPr lang="en-US" dirty="0">
-                <a:latin typeface="Consolas" panose="020B0609020204030204" pitchFamily="49" charset="0"/>
-                <a:cs typeface="Consolas" panose="020B0609020204030204" pitchFamily="49" charset="0"/>
-              </a:rPr>
-              <a:t>                        __le16  </a:t>
-            </a:r>
-            <a:r>
-              <a:rPr lang="en-US" dirty="0" err="1">
-                <a:latin typeface="Consolas" panose="020B0609020204030204" pitchFamily="49" charset="0"/>
-                <a:cs typeface="Consolas" panose="020B0609020204030204" pitchFamily="49" charset="0"/>
-              </a:rPr>
-              <a:t>l_i_uid_high</a:t>
-            </a:r>
-            <a:r>
-              <a:rPr lang="en-US" dirty="0">
-                <a:latin typeface="Consolas" panose="020B0609020204030204" pitchFamily="49" charset="0"/>
-                <a:cs typeface="Consolas" panose="020B0609020204030204" pitchFamily="49" charset="0"/>
-              </a:rPr>
-              <a:t>;   /* these 2 fields    */</a:t>
-            </a:r>
-          </a:p>
-          <a:p>
-            <a:r>
-              <a:rPr lang="en-US" dirty="0">
-                <a:latin typeface="Consolas" panose="020B0609020204030204" pitchFamily="49" charset="0"/>
-                <a:cs typeface="Consolas" panose="020B0609020204030204" pitchFamily="49" charset="0"/>
-              </a:rPr>
-              <a:t>                        __le16  </a:t>
-            </a:r>
-            <a:r>
-              <a:rPr lang="en-US" dirty="0" err="1">
-                <a:latin typeface="Consolas" panose="020B0609020204030204" pitchFamily="49" charset="0"/>
-                <a:cs typeface="Consolas" panose="020B0609020204030204" pitchFamily="49" charset="0"/>
-              </a:rPr>
-              <a:t>l_i_gid_high</a:t>
-            </a:r>
-            <a:r>
-              <a:rPr lang="en-US" dirty="0">
-                <a:latin typeface="Consolas" panose="020B0609020204030204" pitchFamily="49" charset="0"/>
-                <a:cs typeface="Consolas" panose="020B0609020204030204" pitchFamily="49" charset="0"/>
-              </a:rPr>
-              <a:t>;   /* were reserved2[0] */</a:t>
-            </a:r>
-          </a:p>
-          <a:p>
-            <a:r>
-              <a:rPr lang="en-US" dirty="0">
-                <a:latin typeface="Consolas" panose="020B0609020204030204" pitchFamily="49" charset="0"/>
-                <a:cs typeface="Consolas" panose="020B0609020204030204" pitchFamily="49" charset="0"/>
-              </a:rPr>
-              <a:t>                        __u32   l_i_reserved2;</a:t>
-            </a:r>
-          </a:p>
-          <a:p>
-            <a:r>
-              <a:rPr lang="en-US" dirty="0">
-                <a:latin typeface="Consolas" panose="020B0609020204030204" pitchFamily="49" charset="0"/>
-                <a:cs typeface="Consolas" panose="020B0609020204030204" pitchFamily="49" charset="0"/>
-              </a:rPr>
-              <a:t>                } linux2;</a:t>
-            </a:r>
-          </a:p>
-          <a:p>
-            <a:r>
-              <a:rPr lang="en-US" dirty="0">
-                <a:latin typeface="Consolas" panose="020B0609020204030204" pitchFamily="49" charset="0"/>
-                <a:cs typeface="Consolas" panose="020B0609020204030204" pitchFamily="49" charset="0"/>
-              </a:rPr>
-              <a:t>        } osd2;                         /* OS dependent 2 */</a:t>
+              <a:t>        __le8   i_osd2[12];</a:t>
             </a:r>
           </a:p>
           <a:p>
@@ -40289,7 +40088,7 @@
     </p:spTree>
     <p:extLst>
       <p:ext uri="{BB962C8B-B14F-4D97-AF65-F5344CB8AC3E}">
-        <p14:creationId xmlns:p14="http://schemas.microsoft.com/office/powerpoint/2010/main" val="3832082111"/>
+        <p14:creationId xmlns:p14="http://schemas.microsoft.com/office/powerpoint/2010/main" val="3641872543"/>
       </p:ext>
     </p:extLst>
   </p:cSld>
@@ -40381,7 +40180,7 @@
           <p:nvPr>
             <p:extLst>
               <p:ext uri="{D42A27DB-BD31-4B8C-83A1-F6EECF244321}">
-                <p14:modId xmlns:p14="http://schemas.microsoft.com/office/powerpoint/2010/main" val="3038932468"/>
+                <p14:modId xmlns:p14="http://schemas.microsoft.com/office/powerpoint/2010/main" val="3653435508"/>
               </p:ext>
             </p:extLst>
           </p:nvPr>
@@ -40435,8 +40234,8 @@
           <p:nvPr/>
         </p:nvGraphicFramePr>
         <p:xfrm>
-          <a:off x="0" y="365762"/>
-          <a:ext cx="12192000" cy="1920240"/>
+          <a:off x="0" y="365761"/>
+          <a:ext cx="12192000" cy="6035040"/>
         </p:xfrm>
         <a:graphic>
           <a:graphicData uri="http://schemas.openxmlformats.org/drawingml/2006/table">
@@ -40453,7 +40252,7 @@
                   </a:extLst>
                 </a:gridCol>
               </a:tblGrid>
-              <a:tr h="211959">
+              <a:tr h="143732">
                 <a:tc>
                   <a:txBody>
                     <a:bodyPr/>
@@ -40461,8 +40260,49 @@
                     <a:p>
                       <a:r>
                         <a:rPr lang="ru-RU" sz="2400" dirty="0"/>
-                        <a:t>Дополнительное чтение</a:t>
-                      </a:r>
+                        <a:t>Пример </a:t>
+                      </a:r>
+                      <a:r>
+                        <a:rPr lang="en-US" sz="2400" dirty="0"/>
+                        <a:t>(</a:t>
+                      </a:r>
+                      <a:r>
+                        <a:rPr lang="ru-RU" sz="2400" dirty="0"/>
+                        <a:t>почти) </a:t>
+                      </a:r>
+                      <a:r>
+                        <a:rPr lang="en-US" sz="2400" dirty="0" err="1"/>
+                        <a:t>compat</a:t>
+                      </a:r>
+                      <a:r>
+                        <a:rPr lang="en-US" sz="2400" dirty="0"/>
+                        <a:t> feature: 32-</a:t>
+                      </a:r>
+                      <a:r>
+                        <a:rPr lang="ru-RU" sz="2400" dirty="0"/>
+                        <a:t>битные </a:t>
+                      </a:r>
+                      <a:r>
+                        <a:rPr lang="en-US" sz="2400" dirty="0"/>
+                        <a:t>UID </a:t>
+                      </a:r>
+                      <a:r>
+                        <a:rPr lang="ru-RU" sz="2400" dirty="0"/>
+                        <a:t>и</a:t>
+                      </a:r>
+                      <a:r>
+                        <a:rPr lang="ru-RU" sz="2400" baseline="0" dirty="0"/>
+                        <a:t> </a:t>
+                      </a:r>
+                      <a:r>
+                        <a:rPr lang="en-US" sz="2400" baseline="0" dirty="0"/>
+                        <a:t>GID </a:t>
+                      </a:r>
+                      <a:r>
+                        <a:rPr lang="ru-RU" sz="2400" baseline="0" dirty="0"/>
+                        <a:t>владельца</a:t>
+                      </a:r>
+                      <a:endParaRPr lang="ru-RU" sz="2400" dirty="0"/>
                     </a:p>
                   </a:txBody>
                   <a:tcPr/>
@@ -40473,69 +40313,97 @@
                   </a:ext>
                 </a:extLst>
               </a:tr>
-              <a:tr h="171923">
-                <a:tc>
-                  <a:txBody>
-                    <a:bodyPr/>
-                    <a:lstStyle/>
-                    <a:p>
-                      <a:pPr marL="285750" indent="-285750">
-                        <a:buFont typeface="Arial" panose="020B0604020202020204" pitchFamily="34" charset="0"/>
-                        <a:buChar char="•"/>
-                      </a:pPr>
-                      <a:r>
-                        <a:rPr lang="en-US" dirty="0">
-                          <a:hlinkClick r:id="rId3"/>
-                        </a:rPr>
-                        <a:t>http://www.nongnu.org/ext2-doc</a:t>
-                      </a:r>
-                      <a:endParaRPr lang="en-US" dirty="0"/>
-                    </a:p>
-                    <a:p>
-                      <a:pPr marL="285750" indent="-285750">
-                        <a:buFont typeface="Arial" panose="020B0604020202020204" pitchFamily="34" charset="0"/>
-                        <a:buChar char="•"/>
-                      </a:pPr>
-                      <a:r>
-                        <a:rPr lang="en-US" dirty="0">
-                          <a:hlinkClick r:id="rId4"/>
-                        </a:rPr>
-                        <a:t>https://ext4.wiki.kernel.org/index.php/Ext4_Disk_Layout</a:t>
-                      </a:r>
-                      <a:endParaRPr lang="en-US" dirty="0"/>
-                    </a:p>
-                    <a:p>
-                      <a:pPr marL="285750" indent="-285750">
-                        <a:buFont typeface="Arial" panose="020B0604020202020204" pitchFamily="34" charset="0"/>
-                        <a:buChar char="•"/>
-                      </a:pPr>
-                      <a:r>
-                        <a:rPr lang="en-US" dirty="0">
-                          <a:hlinkClick r:id="rId5"/>
-                        </a:rPr>
-                        <a:t>http://wiki.osdev.org/Ext2</a:t>
-                      </a:r>
-                      <a:endParaRPr lang="en-US" dirty="0"/>
-                    </a:p>
-                    <a:p>
-                      <a:pPr marL="285750" indent="-285750">
-                        <a:buFont typeface="Arial" panose="020B0604020202020204" pitchFamily="34" charset="0"/>
-                        <a:buChar char="•"/>
-                      </a:pPr>
-                      <a:endParaRPr lang="en-US" dirty="0"/>
-                    </a:p>
-                    <a:p>
-                      <a:pPr marL="285750" indent="-285750">
-                        <a:buFont typeface="Arial" panose="020B0604020202020204" pitchFamily="34" charset="0"/>
-                        <a:buChar char="•"/>
-                      </a:pPr>
-                      <a:r>
-                        <a:rPr lang="en-US" dirty="0">
-                          <a:hlinkClick r:id="rId6"/>
-                        </a:rPr>
-                        <a:t>https://lwn.net/Articles/322823/</a:t>
-                      </a:r>
-                      <a:endParaRPr lang="en-US" dirty="0"/>
+              <a:tr h="0">
+                <a:tc>
+                  <a:txBody>
+                    <a:bodyPr/>
+                    <a:lstStyle/>
+                    <a:p>
+                      <a:r>
+                        <a:rPr lang="ru-RU" dirty="0"/>
+                        <a:t>Для </a:t>
+                      </a:r>
+                      <a:r>
+                        <a:rPr lang="en-US" dirty="0" err="1"/>
+                        <a:t>linux</a:t>
+                      </a:r>
+                      <a:r>
+                        <a:rPr lang="ru-RU" dirty="0"/>
+                        <a:t> хвост</a:t>
+                      </a:r>
+                      <a:r>
+                        <a:rPr lang="ru-RU" baseline="0" dirty="0"/>
+                        <a:t> </a:t>
+                      </a:r>
+                      <a:r>
+                        <a:rPr lang="en-US" baseline="0" dirty="0" err="1"/>
+                        <a:t>struct</a:t>
+                      </a:r>
+                      <a:r>
+                        <a:rPr lang="en-US" baseline="0" dirty="0"/>
+                        <a:t> ext2_inode </a:t>
+                      </a:r>
+                      <a:r>
+                        <a:rPr lang="ru-RU" baseline="0" dirty="0"/>
+                        <a:t>выглядит так:</a:t>
+                      </a:r>
+                    </a:p>
+                    <a:p>
+                      <a:endParaRPr lang="ru-RU" baseline="0" dirty="0"/>
+                    </a:p>
+                    <a:p>
+                      <a:endParaRPr lang="ru-RU" baseline="0" dirty="0"/>
+                    </a:p>
+                    <a:p>
+                      <a:endParaRPr lang="ru-RU" baseline="0" dirty="0"/>
+                    </a:p>
+                    <a:p>
+                      <a:endParaRPr lang="en-US" baseline="0" dirty="0"/>
+                    </a:p>
+                    <a:p>
+                      <a:endParaRPr lang="en-US" baseline="0" dirty="0"/>
+                    </a:p>
+                    <a:p>
+                      <a:endParaRPr lang="en-US" baseline="0" dirty="0"/>
+                    </a:p>
+                    <a:p>
+                      <a:endParaRPr lang="en-US" baseline="0" dirty="0"/>
+                    </a:p>
+                    <a:p>
+                      <a:endParaRPr lang="en-US" baseline="0" dirty="0"/>
+                    </a:p>
+                    <a:p>
+                      <a:endParaRPr lang="en-US" baseline="0" dirty="0"/>
+                    </a:p>
+                    <a:p>
+                      <a:endParaRPr lang="en-US" baseline="0" dirty="0"/>
+                    </a:p>
+                    <a:p>
+                      <a:endParaRPr lang="en-US" baseline="0" dirty="0"/>
+                    </a:p>
+                    <a:p>
+                      <a:endParaRPr lang="en-US" baseline="0" dirty="0"/>
+                    </a:p>
+                    <a:p>
+                      <a:endParaRPr lang="en-US" baseline="0" dirty="0"/>
+                    </a:p>
+                    <a:p>
+                      <a:endParaRPr lang="en-US" baseline="0" dirty="0"/>
+                    </a:p>
+                    <a:p>
+                      <a:endParaRPr lang="en-US" baseline="0" dirty="0"/>
+                    </a:p>
+                    <a:p>
+                      <a:endParaRPr lang="en-US" baseline="0" dirty="0"/>
+                    </a:p>
+                    <a:p>
+                      <a:endParaRPr lang="en-US" baseline="0" dirty="0"/>
+                    </a:p>
+                    <a:p>
+                      <a:endParaRPr lang="en-US" baseline="0" dirty="0"/>
+                    </a:p>
+                    <a:p>
+                      <a:endParaRPr lang="en-US" baseline="0" dirty="0"/>
                     </a:p>
                   </a:txBody>
                   <a:tcPr/>
@@ -40550,10 +40418,315 @@
           </a:graphicData>
         </a:graphic>
       </p:graphicFrame>
+      <p:sp>
+        <p:nvSpPr>
+          <p:cNvPr id="3" name="TextBox 2">
+            <a:extLst>
+              <a:ext uri="{FF2B5EF4-FFF2-40B4-BE49-F238E27FC236}">
+                <a16:creationId xmlns:a16="http://schemas.microsoft.com/office/drawing/2014/main" id="{1C73EA6D-1593-6C4B-A670-CEDED90ADCFB}"/>
+              </a:ext>
+            </a:extLst>
+          </p:cNvPr>
+          <p:cNvSpPr txBox="1"/>
+          <p:nvPr/>
+        </p:nvSpPr>
+        <p:spPr>
+          <a:xfrm>
+            <a:off x="1508045" y="1349827"/>
+            <a:ext cx="9175910" cy="4524315"/>
+          </a:xfrm>
+          <a:prstGeom prst="rect">
+            <a:avLst/>
+          </a:prstGeom>
+          <a:solidFill>
+            <a:schemeClr val="bg1"/>
+          </a:solidFill>
+        </p:spPr>
+        <p:txBody>
+          <a:bodyPr wrap="none" rtlCol="0">
+            <a:spAutoFit/>
+          </a:bodyPr>
+          <a:lstStyle/>
+          <a:p>
+            <a:r>
+              <a:rPr lang="en-US" dirty="0">
+                <a:latin typeface="Consolas" panose="020B0609020204030204" pitchFamily="49" charset="0"/>
+                <a:cs typeface="Consolas" panose="020B0609020204030204" pitchFamily="49" charset="0"/>
+              </a:rPr>
+              <a:t>        __le32  </a:t>
+            </a:r>
+            <a:r>
+              <a:rPr lang="en-US" dirty="0" err="1">
+                <a:latin typeface="Consolas" panose="020B0609020204030204" pitchFamily="49" charset="0"/>
+                <a:cs typeface="Consolas" panose="020B0609020204030204" pitchFamily="49" charset="0"/>
+              </a:rPr>
+              <a:t>i_block</a:t>
+            </a:r>
+            <a:r>
+              <a:rPr lang="en-US" dirty="0">
+                <a:latin typeface="Consolas" panose="020B0609020204030204" pitchFamily="49" charset="0"/>
+                <a:cs typeface="Consolas" panose="020B0609020204030204" pitchFamily="49" charset="0"/>
+              </a:rPr>
+              <a:t>[EXT2_N_BLOCKS];/* Pointers to blocks */</a:t>
+            </a:r>
+          </a:p>
+          <a:p>
+            <a:r>
+              <a:rPr lang="en-US" dirty="0">
+                <a:latin typeface="Consolas" panose="020B0609020204030204" pitchFamily="49" charset="0"/>
+                <a:cs typeface="Consolas" panose="020B0609020204030204" pitchFamily="49" charset="0"/>
+              </a:rPr>
+              <a:t>        __le32  </a:t>
+            </a:r>
+            <a:r>
+              <a:rPr lang="en-US" dirty="0" err="1">
+                <a:latin typeface="Consolas" panose="020B0609020204030204" pitchFamily="49" charset="0"/>
+                <a:cs typeface="Consolas" panose="020B0609020204030204" pitchFamily="49" charset="0"/>
+              </a:rPr>
+              <a:t>i_generation</a:t>
+            </a:r>
+            <a:r>
+              <a:rPr lang="en-US" dirty="0">
+                <a:latin typeface="Consolas" panose="020B0609020204030204" pitchFamily="49" charset="0"/>
+                <a:cs typeface="Consolas" panose="020B0609020204030204" pitchFamily="49" charset="0"/>
+              </a:rPr>
+              <a:t>;   /* File version (for NFS) */</a:t>
+            </a:r>
+          </a:p>
+          <a:p>
+            <a:r>
+              <a:rPr lang="en-US" dirty="0">
+                <a:latin typeface="Consolas" panose="020B0609020204030204" pitchFamily="49" charset="0"/>
+                <a:cs typeface="Consolas" panose="020B0609020204030204" pitchFamily="49" charset="0"/>
+              </a:rPr>
+              <a:t>        __le32  </a:t>
+            </a:r>
+            <a:r>
+              <a:rPr lang="en-US" dirty="0" err="1">
+                <a:latin typeface="Consolas" panose="020B0609020204030204" pitchFamily="49" charset="0"/>
+                <a:cs typeface="Consolas" panose="020B0609020204030204" pitchFamily="49" charset="0"/>
+              </a:rPr>
+              <a:t>i_file_acl</a:t>
+            </a:r>
+            <a:r>
+              <a:rPr lang="en-US" dirty="0">
+                <a:latin typeface="Consolas" panose="020B0609020204030204" pitchFamily="49" charset="0"/>
+                <a:cs typeface="Consolas" panose="020B0609020204030204" pitchFamily="49" charset="0"/>
+              </a:rPr>
+              <a:t>;     /* File ACL */</a:t>
+            </a:r>
+          </a:p>
+          <a:p>
+            <a:r>
+              <a:rPr lang="en-US" dirty="0">
+                <a:latin typeface="Consolas" panose="020B0609020204030204" pitchFamily="49" charset="0"/>
+                <a:cs typeface="Consolas" panose="020B0609020204030204" pitchFamily="49" charset="0"/>
+              </a:rPr>
+              <a:t>        __le32  </a:t>
+            </a:r>
+            <a:r>
+              <a:rPr lang="en-US" dirty="0" err="1">
+                <a:latin typeface="Consolas" panose="020B0609020204030204" pitchFamily="49" charset="0"/>
+                <a:cs typeface="Consolas" panose="020B0609020204030204" pitchFamily="49" charset="0"/>
+              </a:rPr>
+              <a:t>i_dir_acl</a:t>
+            </a:r>
+            <a:r>
+              <a:rPr lang="en-US" dirty="0">
+                <a:latin typeface="Consolas" panose="020B0609020204030204" pitchFamily="49" charset="0"/>
+                <a:cs typeface="Consolas" panose="020B0609020204030204" pitchFamily="49" charset="0"/>
+              </a:rPr>
+              <a:t>;      /* Directory ACL */</a:t>
+            </a:r>
+          </a:p>
+          <a:p>
+            <a:r>
+              <a:rPr lang="en-US" dirty="0">
+                <a:latin typeface="Consolas" panose="020B0609020204030204" pitchFamily="49" charset="0"/>
+                <a:cs typeface="Consolas" panose="020B0609020204030204" pitchFamily="49" charset="0"/>
+              </a:rPr>
+              <a:t>        __le32  </a:t>
+            </a:r>
+            <a:r>
+              <a:rPr lang="en-US" dirty="0" err="1">
+                <a:latin typeface="Consolas" panose="020B0609020204030204" pitchFamily="49" charset="0"/>
+                <a:cs typeface="Consolas" panose="020B0609020204030204" pitchFamily="49" charset="0"/>
+              </a:rPr>
+              <a:t>i_faddr</a:t>
+            </a:r>
+            <a:r>
+              <a:rPr lang="en-US" dirty="0">
+                <a:latin typeface="Consolas" panose="020B0609020204030204" pitchFamily="49" charset="0"/>
+                <a:cs typeface="Consolas" panose="020B0609020204030204" pitchFamily="49" charset="0"/>
+              </a:rPr>
+              <a:t>;        /* Fragment address */</a:t>
+            </a:r>
+          </a:p>
+          <a:p>
+            <a:r>
+              <a:rPr lang="en-US" dirty="0">
+                <a:latin typeface="Consolas" panose="020B0609020204030204" pitchFamily="49" charset="0"/>
+                <a:cs typeface="Consolas" panose="020B0609020204030204" pitchFamily="49" charset="0"/>
+              </a:rPr>
+              <a:t>        union {</a:t>
+            </a:r>
+          </a:p>
+          <a:p>
+            <a:r>
+              <a:rPr lang="en-US" dirty="0">
+                <a:latin typeface="Consolas" panose="020B0609020204030204" pitchFamily="49" charset="0"/>
+                <a:cs typeface="Consolas" panose="020B0609020204030204" pitchFamily="49" charset="0"/>
+              </a:rPr>
+              <a:t>                struct {</a:t>
+            </a:r>
+          </a:p>
+          <a:p>
+            <a:r>
+              <a:rPr lang="en-US" dirty="0">
+                <a:latin typeface="Consolas" panose="020B0609020204030204" pitchFamily="49" charset="0"/>
+                <a:cs typeface="Consolas" panose="020B0609020204030204" pitchFamily="49" charset="0"/>
+              </a:rPr>
+              <a:t>                        __u8    </a:t>
+            </a:r>
+            <a:r>
+              <a:rPr lang="en-US" dirty="0" err="1">
+                <a:latin typeface="Consolas" panose="020B0609020204030204" pitchFamily="49" charset="0"/>
+                <a:cs typeface="Consolas" panose="020B0609020204030204" pitchFamily="49" charset="0"/>
+              </a:rPr>
+              <a:t>l_i_frag</a:t>
+            </a:r>
+            <a:r>
+              <a:rPr lang="en-US" dirty="0">
+                <a:latin typeface="Consolas" panose="020B0609020204030204" pitchFamily="49" charset="0"/>
+                <a:cs typeface="Consolas" panose="020B0609020204030204" pitchFamily="49" charset="0"/>
+              </a:rPr>
+              <a:t>;       /* Fragment number */</a:t>
+            </a:r>
+          </a:p>
+          <a:p>
+            <a:r>
+              <a:rPr lang="en-US" dirty="0">
+                <a:latin typeface="Consolas" panose="020B0609020204030204" pitchFamily="49" charset="0"/>
+                <a:cs typeface="Consolas" panose="020B0609020204030204" pitchFamily="49" charset="0"/>
+              </a:rPr>
+              <a:t>                        __u8    </a:t>
+            </a:r>
+            <a:r>
+              <a:rPr lang="en-US" dirty="0" err="1">
+                <a:latin typeface="Consolas" panose="020B0609020204030204" pitchFamily="49" charset="0"/>
+                <a:cs typeface="Consolas" panose="020B0609020204030204" pitchFamily="49" charset="0"/>
+              </a:rPr>
+              <a:t>l_i_fsize</a:t>
+            </a:r>
+            <a:r>
+              <a:rPr lang="en-US" dirty="0">
+                <a:latin typeface="Consolas" panose="020B0609020204030204" pitchFamily="49" charset="0"/>
+                <a:cs typeface="Consolas" panose="020B0609020204030204" pitchFamily="49" charset="0"/>
+              </a:rPr>
+              <a:t>;      /* Fragment size */</a:t>
+            </a:r>
+          </a:p>
+          <a:p>
+            <a:r>
+              <a:rPr lang="en-US" dirty="0">
+                <a:latin typeface="Consolas" panose="020B0609020204030204" pitchFamily="49" charset="0"/>
+                <a:cs typeface="Consolas" panose="020B0609020204030204" pitchFamily="49" charset="0"/>
+              </a:rPr>
+              <a:t>                        __u16   i_pad1;</a:t>
+            </a:r>
+          </a:p>
+          <a:p>
+            <a:r>
+              <a:rPr lang="en-US" dirty="0">
+                <a:latin typeface="Consolas" panose="020B0609020204030204" pitchFamily="49" charset="0"/>
+                <a:cs typeface="Consolas" panose="020B0609020204030204" pitchFamily="49" charset="0"/>
+              </a:rPr>
+              <a:t>                        __le16  </a:t>
+            </a:r>
+            <a:r>
+              <a:rPr lang="en-US" dirty="0" err="1">
+                <a:latin typeface="Consolas" panose="020B0609020204030204" pitchFamily="49" charset="0"/>
+                <a:cs typeface="Consolas" panose="020B0609020204030204" pitchFamily="49" charset="0"/>
+              </a:rPr>
+              <a:t>l_i_uid_high</a:t>
+            </a:r>
+            <a:r>
+              <a:rPr lang="en-US" dirty="0">
+                <a:latin typeface="Consolas" panose="020B0609020204030204" pitchFamily="49" charset="0"/>
+                <a:cs typeface="Consolas" panose="020B0609020204030204" pitchFamily="49" charset="0"/>
+              </a:rPr>
+              <a:t>;   /* these 2 fields    */</a:t>
+            </a:r>
+          </a:p>
+          <a:p>
+            <a:r>
+              <a:rPr lang="en-US" dirty="0">
+                <a:latin typeface="Consolas" panose="020B0609020204030204" pitchFamily="49" charset="0"/>
+                <a:cs typeface="Consolas" panose="020B0609020204030204" pitchFamily="49" charset="0"/>
+              </a:rPr>
+              <a:t>                        __le16  </a:t>
+            </a:r>
+            <a:r>
+              <a:rPr lang="en-US" dirty="0" err="1">
+                <a:latin typeface="Consolas" panose="020B0609020204030204" pitchFamily="49" charset="0"/>
+                <a:cs typeface="Consolas" panose="020B0609020204030204" pitchFamily="49" charset="0"/>
+              </a:rPr>
+              <a:t>l_i_gid_high</a:t>
+            </a:r>
+            <a:r>
+              <a:rPr lang="en-US" dirty="0">
+                <a:latin typeface="Consolas" panose="020B0609020204030204" pitchFamily="49" charset="0"/>
+                <a:cs typeface="Consolas" panose="020B0609020204030204" pitchFamily="49" charset="0"/>
+              </a:rPr>
+              <a:t>;   /* were reserved2[0] */</a:t>
+            </a:r>
+          </a:p>
+          <a:p>
+            <a:r>
+              <a:rPr lang="en-US" dirty="0">
+                <a:latin typeface="Consolas" panose="020B0609020204030204" pitchFamily="49" charset="0"/>
+                <a:cs typeface="Consolas" panose="020B0609020204030204" pitchFamily="49" charset="0"/>
+              </a:rPr>
+              <a:t>                        __u32   l_i_reserved2;</a:t>
+            </a:r>
+          </a:p>
+          <a:p>
+            <a:r>
+              <a:rPr lang="en-US" dirty="0">
+                <a:latin typeface="Consolas" panose="020B0609020204030204" pitchFamily="49" charset="0"/>
+                <a:cs typeface="Consolas" panose="020B0609020204030204" pitchFamily="49" charset="0"/>
+              </a:rPr>
+              <a:t>                } linux2;</a:t>
+            </a:r>
+          </a:p>
+          <a:p>
+            <a:r>
+              <a:rPr lang="en-US" dirty="0">
+                <a:latin typeface="Consolas" panose="020B0609020204030204" pitchFamily="49" charset="0"/>
+                <a:cs typeface="Consolas" panose="020B0609020204030204" pitchFamily="49" charset="0"/>
+              </a:rPr>
+              <a:t>        } osd2;                         /* OS dependent 2 */</a:t>
+            </a:r>
+          </a:p>
+          <a:p>
+            <a:r>
+              <a:rPr lang="en-US" dirty="0">
+                <a:latin typeface="Consolas" panose="020B0609020204030204" pitchFamily="49" charset="0"/>
+                <a:cs typeface="Consolas" panose="020B0609020204030204" pitchFamily="49" charset="0"/>
+              </a:rPr>
+              <a:t>};</a:t>
+            </a:r>
+            <a:endParaRPr lang="ru-RU" dirty="0">
+              <a:latin typeface="Consolas" panose="020B0609020204030204" pitchFamily="49" charset="0"/>
+              <a:cs typeface="Consolas" panose="020B0609020204030204" pitchFamily="49" charset="0"/>
+            </a:endParaRPr>
+          </a:p>
+        </p:txBody>
+      </p:sp>
     </p:spTree>
     <p:extLst>
       <p:ext uri="{BB962C8B-B14F-4D97-AF65-F5344CB8AC3E}">
-        <p14:creationId xmlns:p14="http://schemas.microsoft.com/office/powerpoint/2010/main" val="3696274954"/>
+        <p14:creationId xmlns:p14="http://schemas.microsoft.com/office/powerpoint/2010/main" val="3832082111"/>
       </p:ext>
     </p:extLst>
   </p:cSld>
@@ -40645,6 +40818,270 @@
           <p:nvPr>
             <p:extLst>
               <p:ext uri="{D42A27DB-BD31-4B8C-83A1-F6EECF244321}">
+                <p14:modId xmlns:p14="http://schemas.microsoft.com/office/powerpoint/2010/main" val="3038932468"/>
+              </p:ext>
+            </p:extLst>
+          </p:nvPr>
+        </p:nvGraphicFramePr>
+        <p:xfrm>
+          <a:off x="0" y="6532604"/>
+          <a:ext cx="12192000" cy="365760"/>
+        </p:xfrm>
+        <a:graphic>
+          <a:graphicData uri="http://schemas.openxmlformats.org/drawingml/2006/table">
+            <a:tbl>
+              <a:tblPr firstRow="1" bandRow="1">
+                <a:tableStyleId>{5C22544A-7EE6-4342-B048-85BDC9FD1C3A}</a:tableStyleId>
+              </a:tblPr>
+              <a:tblGrid>
+                <a:gridCol w="12192000">
+                  <a:extLst>
+                    <a:ext uri="{9D8B030D-6E8A-4147-A177-3AD203B41FA5}">
+                      <a16:colId xmlns:a16="http://schemas.microsoft.com/office/drawing/2014/main" val="20000"/>
+                    </a:ext>
+                  </a:extLst>
+                </a:gridCol>
+              </a:tblGrid>
+              <a:tr h="308094">
+                <a:tc>
+                  <a:txBody>
+                    <a:bodyPr/>
+                    <a:lstStyle/>
+                    <a:p>
+                      <a:endParaRPr lang="ru-RU" dirty="0"/>
+                    </a:p>
+                  </a:txBody>
+                  <a:tcPr/>
+                </a:tc>
+                <a:extLst>
+                  <a:ext uri="{0D108BD9-81ED-4DB2-BD59-A6C34878D82A}">
+                    <a16:rowId xmlns:a16="http://schemas.microsoft.com/office/drawing/2014/main" val="10000"/>
+                  </a:ext>
+                </a:extLst>
+              </a:tr>
+            </a:tbl>
+          </a:graphicData>
+        </a:graphic>
+      </p:graphicFrame>
+      <p:graphicFrame>
+        <p:nvGraphicFramePr>
+          <p:cNvPr id="2" name="Table 1"/>
+          <p:cNvGraphicFramePr>
+            <a:graphicFrameLocks noGrp="1"/>
+          </p:cNvGraphicFramePr>
+          <p:nvPr/>
+        </p:nvGraphicFramePr>
+        <p:xfrm>
+          <a:off x="0" y="365762"/>
+          <a:ext cx="12192000" cy="1920240"/>
+        </p:xfrm>
+        <a:graphic>
+          <a:graphicData uri="http://schemas.openxmlformats.org/drawingml/2006/table">
+            <a:tbl>
+              <a:tblPr firstRow="1" bandRow="1">
+                <a:tableStyleId>{3B4B98B0-60AC-42C2-AFA5-B58CD77FA1E5}</a:tableStyleId>
+              </a:tblPr>
+              <a:tblGrid>
+                <a:gridCol w="12192000">
+                  <a:extLst>
+                    <a:ext uri="{9D8B030D-6E8A-4147-A177-3AD203B41FA5}">
+                      <a16:colId xmlns:a16="http://schemas.microsoft.com/office/drawing/2014/main" val="20000"/>
+                    </a:ext>
+                  </a:extLst>
+                </a:gridCol>
+              </a:tblGrid>
+              <a:tr h="211959">
+                <a:tc>
+                  <a:txBody>
+                    <a:bodyPr/>
+                    <a:lstStyle/>
+                    <a:p>
+                      <a:r>
+                        <a:rPr lang="ru-RU" sz="2400" dirty="0"/>
+                        <a:t>Дополнительное чтение</a:t>
+                      </a:r>
+                    </a:p>
+                  </a:txBody>
+                  <a:tcPr/>
+                </a:tc>
+                <a:extLst>
+                  <a:ext uri="{0D108BD9-81ED-4DB2-BD59-A6C34878D82A}">
+                    <a16:rowId xmlns:a16="http://schemas.microsoft.com/office/drawing/2014/main" val="10000"/>
+                  </a:ext>
+                </a:extLst>
+              </a:tr>
+              <a:tr h="171923">
+                <a:tc>
+                  <a:txBody>
+                    <a:bodyPr/>
+                    <a:lstStyle/>
+                    <a:p>
+                      <a:pPr marL="285750" indent="-285750">
+                        <a:buFont typeface="Arial" panose="020B0604020202020204" pitchFamily="34" charset="0"/>
+                        <a:buChar char="•"/>
+                      </a:pPr>
+                      <a:r>
+                        <a:rPr lang="en-US" dirty="0">
+                          <a:hlinkClick r:id="rId3"/>
+                        </a:rPr>
+                        <a:t>http://www.nongnu.org/ext2-doc</a:t>
+                      </a:r>
+                      <a:endParaRPr lang="en-US" dirty="0"/>
+                    </a:p>
+                    <a:p>
+                      <a:pPr marL="285750" indent="-285750">
+                        <a:buFont typeface="Arial" panose="020B0604020202020204" pitchFamily="34" charset="0"/>
+                        <a:buChar char="•"/>
+                      </a:pPr>
+                      <a:r>
+                        <a:rPr lang="en-US" dirty="0">
+                          <a:hlinkClick r:id="rId4"/>
+                        </a:rPr>
+                        <a:t>https://ext4.wiki.kernel.org/index.php/Ext4_Disk_Layout</a:t>
+                      </a:r>
+                      <a:endParaRPr lang="en-US" dirty="0"/>
+                    </a:p>
+                    <a:p>
+                      <a:pPr marL="285750" indent="-285750">
+                        <a:buFont typeface="Arial" panose="020B0604020202020204" pitchFamily="34" charset="0"/>
+                        <a:buChar char="•"/>
+                      </a:pPr>
+                      <a:r>
+                        <a:rPr lang="en-US" dirty="0">
+                          <a:hlinkClick r:id="rId5"/>
+                        </a:rPr>
+                        <a:t>http://wiki.osdev.org/Ext2</a:t>
+                      </a:r>
+                      <a:endParaRPr lang="en-US" dirty="0"/>
+                    </a:p>
+                    <a:p>
+                      <a:pPr marL="285750" indent="-285750">
+                        <a:buFont typeface="Arial" panose="020B0604020202020204" pitchFamily="34" charset="0"/>
+                        <a:buChar char="•"/>
+                      </a:pPr>
+                      <a:endParaRPr lang="en-US" dirty="0"/>
+                    </a:p>
+                    <a:p>
+                      <a:pPr marL="285750" indent="-285750">
+                        <a:buFont typeface="Arial" panose="020B0604020202020204" pitchFamily="34" charset="0"/>
+                        <a:buChar char="•"/>
+                      </a:pPr>
+                      <a:r>
+                        <a:rPr lang="en-US" dirty="0">
+                          <a:hlinkClick r:id="rId6"/>
+                        </a:rPr>
+                        <a:t>https://lwn.net/Articles/322823/</a:t>
+                      </a:r>
+                      <a:endParaRPr lang="en-US" dirty="0"/>
+                    </a:p>
+                  </a:txBody>
+                  <a:tcPr/>
+                </a:tc>
+                <a:extLst>
+                  <a:ext uri="{0D108BD9-81ED-4DB2-BD59-A6C34878D82A}">
+                    <a16:rowId xmlns:a16="http://schemas.microsoft.com/office/drawing/2014/main" val="10001"/>
+                  </a:ext>
+                </a:extLst>
+              </a:tr>
+            </a:tbl>
+          </a:graphicData>
+        </a:graphic>
+      </p:graphicFrame>
+    </p:spTree>
+    <p:extLst>
+      <p:ext uri="{BB962C8B-B14F-4D97-AF65-F5344CB8AC3E}">
+        <p14:creationId xmlns:p14="http://schemas.microsoft.com/office/powerpoint/2010/main" val="3696274954"/>
+      </p:ext>
+    </p:extLst>
+  </p:cSld>
+  <p:clrMapOvr>
+    <a:masterClrMapping/>
+  </p:clrMapOvr>
+</p:sld>
+</file>
+
+<file path=ppt/slides/slide46.xml><?xml version="1.0" encoding="utf-8"?>
+<p:sld xmlns:a="http://schemas.openxmlformats.org/drawingml/2006/main" xmlns:r="http://schemas.openxmlformats.org/officeDocument/2006/relationships" xmlns:p="http://schemas.openxmlformats.org/presentationml/2006/main">
+  <p:cSld>
+    <p:spTree>
+      <p:nvGrpSpPr>
+        <p:cNvPr id="1" name=""/>
+        <p:cNvGrpSpPr/>
+        <p:nvPr/>
+      </p:nvGrpSpPr>
+      <p:grpSpPr>
+        <a:xfrm>
+          <a:off x="0" y="0"/>
+          <a:ext cx="0" cy="0"/>
+          <a:chOff x="0" y="0"/>
+          <a:chExt cx="0" cy="0"/>
+        </a:xfrm>
+      </p:grpSpPr>
+      <p:graphicFrame>
+        <p:nvGraphicFramePr>
+          <p:cNvPr id="5" name="Table 4"/>
+          <p:cNvGraphicFramePr>
+            <a:graphicFrameLocks noGrp="1"/>
+          </p:cNvGraphicFramePr>
+          <p:nvPr/>
+        </p:nvGraphicFramePr>
+        <p:xfrm>
+          <a:off x="0" y="1"/>
+          <a:ext cx="12192000" cy="365760"/>
+        </p:xfrm>
+        <a:graphic>
+          <a:graphicData uri="http://schemas.openxmlformats.org/drawingml/2006/table">
+            <a:tbl>
+              <a:tblPr firstRow="1" bandRow="1">
+                <a:tableStyleId>{5C22544A-7EE6-4342-B048-85BDC9FD1C3A}</a:tableStyleId>
+              </a:tblPr>
+              <a:tblGrid>
+                <a:gridCol w="12192000">
+                  <a:extLst>
+                    <a:ext uri="{9D8B030D-6E8A-4147-A177-3AD203B41FA5}">
+                      <a16:colId xmlns:a16="http://schemas.microsoft.com/office/drawing/2014/main" val="20000"/>
+                    </a:ext>
+                  </a:extLst>
+                </a:gridCol>
+              </a:tblGrid>
+              <a:tr h="321276">
+                <a:tc>
+                  <a:txBody>
+                    <a:bodyPr/>
+                    <a:lstStyle/>
+                    <a:p>
+                      <a:r>
+                        <a:rPr lang="ru-RU" dirty="0"/>
+                        <a:t>Основы</a:t>
+                      </a:r>
+                      <a:r>
+                        <a:rPr lang="ru-RU" baseline="0" dirty="0"/>
+                        <a:t> построения файловых систем</a:t>
+                      </a:r>
+                      <a:endParaRPr lang="ru-RU" dirty="0"/>
+                    </a:p>
+                  </a:txBody>
+                  <a:tcPr/>
+                </a:tc>
+                <a:extLst>
+                  <a:ext uri="{0D108BD9-81ED-4DB2-BD59-A6C34878D82A}">
+                    <a16:rowId xmlns:a16="http://schemas.microsoft.com/office/drawing/2014/main" val="10000"/>
+                  </a:ext>
+                </a:extLst>
+              </a:tr>
+            </a:tbl>
+          </a:graphicData>
+        </a:graphic>
+      </p:graphicFrame>
+      <p:graphicFrame>
+        <p:nvGraphicFramePr>
+          <p:cNvPr id="6" name="Table 5"/>
+          <p:cNvGraphicFramePr>
+            <a:graphicFrameLocks noGrp="1"/>
+          </p:cNvGraphicFramePr>
+          <p:nvPr>
+            <p:extLst>
+              <p:ext uri="{D42A27DB-BD31-4B8C-83A1-F6EECF244321}">
                 <p14:modId xmlns:p14="http://schemas.microsoft.com/office/powerpoint/2010/main" val="1972936775"/>
               </p:ext>
             </p:extLst>
@@ -40699,7 +41136,7 @@
           <p:nvPr>
             <p:extLst>
               <p:ext uri="{D42A27DB-BD31-4B8C-83A1-F6EECF244321}">
-                <p14:modId xmlns:p14="http://schemas.microsoft.com/office/powerpoint/2010/main" val="2593804456"/>
+                <p14:modId xmlns:p14="http://schemas.microsoft.com/office/powerpoint/2010/main" val="2686825269"/>
               </p:ext>
             </p:extLst>
           </p:nvPr>
@@ -40974,6 +41411,41 @@
                       <a:endParaRPr lang="en-US" baseline="0" dirty="0"/>
                     </a:p>
                     <a:p>
+                      <a:pPr marL="800100" marR="0" lvl="1" indent="-342900" algn="l" defTabSz="914400" rtl="0" eaLnBrk="1" fontAlgn="auto" latinLnBrk="0" hangingPunct="1">
+                        <a:lnSpc>
+                          <a:spcPct val="100000"/>
+                        </a:lnSpc>
+                        <a:spcBef>
+                          <a:spcPts val="0"/>
+                        </a:spcBef>
+                        <a:spcAft>
+                          <a:spcPts val="0"/>
+                        </a:spcAft>
+                        <a:buClrTx/>
+                        <a:buSzTx/>
+                        <a:buFont typeface="Arial" panose="020B0604020202020204" pitchFamily="34" charset="0"/>
+                        <a:buChar char="•"/>
+                        <a:tabLst/>
+                        <a:defRPr/>
+                      </a:pPr>
+                      <a:r>
+                        <a:rPr lang="ru-RU" baseline="0" dirty="0"/>
+                        <a:t>Прочтёт файл, заданный номером его</a:t>
+                      </a:r>
+                      <a:r>
+                        <a:rPr lang="en-US" baseline="0" dirty="0"/>
+                        <a:t> </a:t>
+                      </a:r>
+                      <a:r>
+                        <a:rPr lang="en-US" baseline="0" dirty="0" err="1"/>
+                        <a:t>inode</a:t>
+                      </a:r>
+                      <a:r>
+                        <a:rPr lang="en-US" baseline="0" dirty="0"/>
+                        <a:t>,</a:t>
+                      </a:r>
+                    </a:p>
+                    <a:p>
                       <a:pPr marL="800100" lvl="1" indent="-342900">
                         <a:buFont typeface="Arial" panose="020B0604020202020204" pitchFamily="34" charset="0"/>
                         <a:buChar char="•"/>
@@ -41001,35 +41473,8 @@
                         <a:buChar char="•"/>
                       </a:pPr>
                       <a:r>
-                        <a:rPr lang="ru-RU" baseline="0"/>
-                        <a:t>Перечислит </a:t>
-                      </a:r>
-                      <a:r>
                         <a:rPr lang="ru-RU" baseline="0" dirty="0"/>
-                        <a:t>элементы в любом каталоге, заданном путём,</a:t>
-                      </a:r>
-                      <a:endParaRPr lang="en-US" baseline="0" dirty="0"/>
-                    </a:p>
-                    <a:p>
-                      <a:pPr marL="800100" lvl="1" indent="-342900">
-                        <a:buFont typeface="Arial" panose="020B0604020202020204" pitchFamily="34" charset="0"/>
-                        <a:buChar char="•"/>
-                      </a:pPr>
-                      <a:r>
-                        <a:rPr lang="ru-RU" baseline="0" dirty="0"/>
-                        <a:t>Прочтёт файл, заданный номером его</a:t>
-                      </a:r>
-                      <a:r>
-                        <a:rPr lang="en-US" baseline="0" dirty="0"/>
-                        <a:t> </a:t>
-                      </a:r>
-                      <a:r>
-                        <a:rPr lang="en-US" baseline="0" dirty="0" err="1"/>
-                        <a:t>inode</a:t>
-                      </a:r>
-                      <a:r>
-                        <a:rPr lang="ru-RU" baseline="0" dirty="0"/>
-                        <a:t>,</a:t>
+                        <a:t>Перечислит элементы в любом каталоге, заданном путём,</a:t>
                       </a:r>
                       <a:endParaRPr lang="en-US" baseline="0" dirty="0"/>
                     </a:p>

</xml_diff>